<commit_message>
updated person_queries.py, movie_query.py, main.py, Academy Award DB , utils.py, web skach.pptx
</commit_message>
<xml_diff>
--- a/Academy Award DB web skach.pptx
+++ b/Academy Award DB web skach.pptx
@@ -206,7 +206,7 @@
           <a:p>
             <a:fld id="{EBBF5D06-8DAF-45B9-B5FF-3211A3F47551}" type="datetimeFigureOut">
               <a:rPr lang="he-IL" smtClean="0"/>
-              <a:t>ה'/שבט/תשפ"ב</a:t>
+              <a:t>ו'/שבט/תשפ"ב</a:t>
             </a:fld>
             <a:endParaRPr lang="he-IL"/>
           </a:p>
@@ -932,7 +932,7 @@
           <a:p>
             <a:fld id="{C73AD0B3-9B2F-4EF4-A0BC-3634FE62E029}" type="datetimeFigureOut">
               <a:rPr lang="he-IL" smtClean="0"/>
-              <a:t>ה'/שבט/תשפ"ב</a:t>
+              <a:t>ו'/שבט/תשפ"ב</a:t>
             </a:fld>
             <a:endParaRPr lang="he-IL"/>
           </a:p>
@@ -1130,7 +1130,7 @@
           <a:p>
             <a:fld id="{C73AD0B3-9B2F-4EF4-A0BC-3634FE62E029}" type="datetimeFigureOut">
               <a:rPr lang="he-IL" smtClean="0"/>
-              <a:t>ה'/שבט/תשפ"ב</a:t>
+              <a:t>ו'/שבט/תשפ"ב</a:t>
             </a:fld>
             <a:endParaRPr lang="he-IL"/>
           </a:p>
@@ -1338,7 +1338,7 @@
           <a:p>
             <a:fld id="{C73AD0B3-9B2F-4EF4-A0BC-3634FE62E029}" type="datetimeFigureOut">
               <a:rPr lang="he-IL" smtClean="0"/>
-              <a:t>ה'/שבט/תשפ"ב</a:t>
+              <a:t>ו'/שבט/תשפ"ב</a:t>
             </a:fld>
             <a:endParaRPr lang="he-IL"/>
           </a:p>
@@ -1536,7 +1536,7 @@
           <a:p>
             <a:fld id="{C73AD0B3-9B2F-4EF4-A0BC-3634FE62E029}" type="datetimeFigureOut">
               <a:rPr lang="he-IL" smtClean="0"/>
-              <a:t>ה'/שבט/תשפ"ב</a:t>
+              <a:t>ו'/שבט/תשפ"ב</a:t>
             </a:fld>
             <a:endParaRPr lang="he-IL"/>
           </a:p>
@@ -1811,7 +1811,7 @@
           <a:p>
             <a:fld id="{C73AD0B3-9B2F-4EF4-A0BC-3634FE62E029}" type="datetimeFigureOut">
               <a:rPr lang="he-IL" smtClean="0"/>
-              <a:t>ה'/שבט/תשפ"ב</a:t>
+              <a:t>ו'/שבט/תשפ"ב</a:t>
             </a:fld>
             <a:endParaRPr lang="he-IL"/>
           </a:p>
@@ -2076,7 +2076,7 @@
           <a:p>
             <a:fld id="{C73AD0B3-9B2F-4EF4-A0BC-3634FE62E029}" type="datetimeFigureOut">
               <a:rPr lang="he-IL" smtClean="0"/>
-              <a:t>ה'/שבט/תשפ"ב</a:t>
+              <a:t>ו'/שבט/תשפ"ב</a:t>
             </a:fld>
             <a:endParaRPr lang="he-IL"/>
           </a:p>
@@ -2488,7 +2488,7 @@
           <a:p>
             <a:fld id="{C73AD0B3-9B2F-4EF4-A0BC-3634FE62E029}" type="datetimeFigureOut">
               <a:rPr lang="he-IL" smtClean="0"/>
-              <a:t>ה'/שבט/תשפ"ב</a:t>
+              <a:t>ו'/שבט/תשפ"ב</a:t>
             </a:fld>
             <a:endParaRPr lang="he-IL"/>
           </a:p>
@@ -2629,7 +2629,7 @@
           <a:p>
             <a:fld id="{C73AD0B3-9B2F-4EF4-A0BC-3634FE62E029}" type="datetimeFigureOut">
               <a:rPr lang="he-IL" smtClean="0"/>
-              <a:t>ה'/שבט/תשפ"ב</a:t>
+              <a:t>ו'/שבט/תשפ"ב</a:t>
             </a:fld>
             <a:endParaRPr lang="he-IL"/>
           </a:p>
@@ -2742,7 +2742,7 @@
           <a:p>
             <a:fld id="{C73AD0B3-9B2F-4EF4-A0BC-3634FE62E029}" type="datetimeFigureOut">
               <a:rPr lang="he-IL" smtClean="0"/>
-              <a:t>ה'/שבט/תשפ"ב</a:t>
+              <a:t>ו'/שבט/תשפ"ב</a:t>
             </a:fld>
             <a:endParaRPr lang="he-IL"/>
           </a:p>
@@ -3053,7 +3053,7 @@
           <a:p>
             <a:fld id="{C73AD0B3-9B2F-4EF4-A0BC-3634FE62E029}" type="datetimeFigureOut">
               <a:rPr lang="he-IL" smtClean="0"/>
-              <a:t>ה'/שבט/תשפ"ב</a:t>
+              <a:t>ו'/שבט/תשפ"ב</a:t>
             </a:fld>
             <a:endParaRPr lang="he-IL"/>
           </a:p>
@@ -3341,7 +3341,7 @@
           <a:p>
             <a:fld id="{C73AD0B3-9B2F-4EF4-A0BC-3634FE62E029}" type="datetimeFigureOut">
               <a:rPr lang="he-IL" smtClean="0"/>
-              <a:t>ה'/שבט/תשפ"ב</a:t>
+              <a:t>ו'/שבט/תשפ"ב</a:t>
             </a:fld>
             <a:endParaRPr lang="he-IL"/>
           </a:p>
@@ -3582,7 +3582,7 @@
           <a:p>
             <a:fld id="{C73AD0B3-9B2F-4EF4-A0BC-3634FE62E029}" type="datetimeFigureOut">
               <a:rPr lang="he-IL" smtClean="0"/>
-              <a:t>ה'/שבט/תשפ"ב</a:t>
+              <a:t>ו'/שבט/תשפ"ב</a:t>
             </a:fld>
             <a:endParaRPr lang="he-IL"/>
           </a:p>
@@ -7200,25 +7200,8 @@
             </a:r>
           </a:p>
           <a:p>
-            <a:pPr lvl="1" algn="l" rtl="0"/>
-            <a:r>
-              <a:rPr lang="en-US" dirty="0"/>
-              <a:t>List of categories</a:t>
-            </a:r>
-          </a:p>
-          <a:p>
             <a:pPr lvl="2" algn="l" rtl="0"/>
-            <a:r>
-              <a:rPr lang="en-US" dirty="0"/>
-              <a:t>Category</a:t>
-            </a:r>
-          </a:p>
-          <a:p>
-            <a:pPr lvl="1" algn="l" rtl="0"/>
-            <a:r>
-              <a:rPr lang="en-US" dirty="0"/>
-              <a:t>Between years </a:t>
-            </a:r>
+            <a:endParaRPr lang="en-US" dirty="0"/>
           </a:p>
           <a:p>
             <a:pPr marL="0" indent="0" algn="l" rtl="0">
@@ -7302,376 +7285,8 @@
       </p:sp>
       <p:sp>
         <p:nvSpPr>
-          <p:cNvPr id="9" name="מלבן 8">
-            <a:extLst>
-              <a:ext uri="{FF2B5EF4-FFF2-40B4-BE49-F238E27FC236}">
-                <a16:creationId xmlns:a16="http://schemas.microsoft.com/office/drawing/2014/main" id="{4BEE706D-0656-4D4F-BAC4-FBA58687617E}"/>
-              </a:ext>
-            </a:extLst>
-          </p:cNvPr>
-          <p:cNvSpPr/>
-          <p:nvPr/>
-        </p:nvSpPr>
-        <p:spPr>
-          <a:xfrm>
-            <a:off x="3507100" y="4661579"/>
-            <a:ext cx="1148858" cy="218114"/>
-          </a:xfrm>
-          <a:prstGeom prst="rect">
-            <a:avLst/>
-          </a:prstGeom>
-          <a:solidFill>
-            <a:schemeClr val="bg1">
-              <a:lumMod val="95000"/>
-            </a:schemeClr>
-          </a:solidFill>
-          <a:ln>
-            <a:noFill/>
-          </a:ln>
-        </p:spPr>
-        <p:style>
-          <a:lnRef idx="2">
-            <a:schemeClr val="accent1">
-              <a:shade val="50000"/>
-            </a:schemeClr>
-          </a:lnRef>
-          <a:fillRef idx="1">
-            <a:schemeClr val="accent1"/>
-          </a:fillRef>
-          <a:effectRef idx="0">
-            <a:schemeClr val="accent1"/>
-          </a:effectRef>
-          <a:fontRef idx="minor">
-            <a:schemeClr val="lt1"/>
-          </a:fontRef>
-        </p:style>
-        <p:txBody>
-          <a:bodyPr rtlCol="1" anchor="ctr"/>
-          <a:lstStyle/>
-          <a:p>
-            <a:pPr algn="ctr"/>
-            <a:r>
-              <a:rPr lang="en-US" dirty="0">
-                <a:solidFill>
-                  <a:schemeClr val="tx1">
-                    <a:lumMod val="65000"/>
-                    <a:lumOff val="35000"/>
-                  </a:schemeClr>
-                </a:solidFill>
-              </a:rPr>
-              <a:t>Min year</a:t>
-            </a:r>
-            <a:endParaRPr lang="he-IL" dirty="0">
-              <a:solidFill>
-                <a:schemeClr val="tx1">
-                  <a:lumMod val="65000"/>
-                  <a:lumOff val="35000"/>
-                </a:schemeClr>
-              </a:solidFill>
-            </a:endParaRPr>
-          </a:p>
-        </p:txBody>
-      </p:sp>
-      <p:sp>
-        <p:nvSpPr>
-          <p:cNvPr id="10" name="מלבן 9">
-            <a:extLst>
-              <a:ext uri="{FF2B5EF4-FFF2-40B4-BE49-F238E27FC236}">
-                <a16:creationId xmlns:a16="http://schemas.microsoft.com/office/drawing/2014/main" id="{C4A94E36-AE8B-44F4-9CC4-6415D3271B08}"/>
-              </a:ext>
-            </a:extLst>
-          </p:cNvPr>
-          <p:cNvSpPr/>
-          <p:nvPr/>
-        </p:nvSpPr>
-        <p:spPr>
-          <a:xfrm>
-            <a:off x="4769944" y="4661579"/>
-            <a:ext cx="1080751" cy="218114"/>
-          </a:xfrm>
-          <a:prstGeom prst="rect">
-            <a:avLst/>
-          </a:prstGeom>
-          <a:solidFill>
-            <a:schemeClr val="bg1">
-              <a:lumMod val="95000"/>
-            </a:schemeClr>
-          </a:solidFill>
-          <a:ln>
-            <a:noFill/>
-          </a:ln>
-        </p:spPr>
-        <p:style>
-          <a:lnRef idx="2">
-            <a:schemeClr val="accent1">
-              <a:shade val="50000"/>
-            </a:schemeClr>
-          </a:lnRef>
-          <a:fillRef idx="1">
-            <a:schemeClr val="accent1"/>
-          </a:fillRef>
-          <a:effectRef idx="0">
-            <a:schemeClr val="accent1"/>
-          </a:effectRef>
-          <a:fontRef idx="minor">
-            <a:schemeClr val="lt1"/>
-          </a:fontRef>
-        </p:style>
-        <p:txBody>
-          <a:bodyPr rtlCol="1" anchor="ctr"/>
-          <a:lstStyle/>
-          <a:p>
-            <a:pPr algn="ctr"/>
-            <a:r>
-              <a:rPr lang="en-US" dirty="0">
-                <a:solidFill>
-                  <a:schemeClr val="tx1">
-                    <a:lumMod val="65000"/>
-                    <a:lumOff val="35000"/>
-                  </a:schemeClr>
-                </a:solidFill>
-              </a:rPr>
-              <a:t>Max year</a:t>
-            </a:r>
-            <a:endParaRPr lang="he-IL" dirty="0">
-              <a:solidFill>
-                <a:schemeClr val="tx1">
-                  <a:lumMod val="65000"/>
-                  <a:lumOff val="35000"/>
-                </a:schemeClr>
-              </a:solidFill>
-            </a:endParaRPr>
-          </a:p>
-        </p:txBody>
-      </p:sp>
-      <p:grpSp>
-        <p:nvGrpSpPr>
-          <p:cNvPr id="23" name="קבוצה 22">
-            <a:extLst>
-              <a:ext uri="{FF2B5EF4-FFF2-40B4-BE49-F238E27FC236}">
-                <a16:creationId xmlns:a16="http://schemas.microsoft.com/office/drawing/2014/main" id="{D30789EF-C7B2-45A4-945E-6EDA757D7D1E}"/>
-              </a:ext>
-            </a:extLst>
-          </p:cNvPr>
-          <p:cNvGrpSpPr/>
-          <p:nvPr/>
-        </p:nvGrpSpPr>
-        <p:grpSpPr>
-          <a:xfrm>
-            <a:off x="1272803" y="3900625"/>
-            <a:ext cx="292963" cy="218114"/>
-            <a:chOff x="5184559" y="3429000"/>
-            <a:chExt cx="292963" cy="218114"/>
-          </a:xfrm>
-        </p:grpSpPr>
-        <p:sp>
-          <p:nvSpPr>
-            <p:cNvPr id="24" name="אליפסה 23">
-              <a:extLst>
-                <a:ext uri="{FF2B5EF4-FFF2-40B4-BE49-F238E27FC236}">
-                  <a16:creationId xmlns:a16="http://schemas.microsoft.com/office/drawing/2014/main" id="{99FC1E3A-CC3A-4B5D-98E7-4A65FDB5332B}"/>
-                </a:ext>
-              </a:extLst>
-            </p:cNvPr>
-            <p:cNvSpPr/>
-            <p:nvPr/>
-          </p:nvSpPr>
-          <p:spPr>
-            <a:xfrm>
-              <a:off x="5184559" y="3429000"/>
-              <a:ext cx="292963" cy="218114"/>
-            </a:xfrm>
-            <a:prstGeom prst="ellipse">
-              <a:avLst/>
-            </a:prstGeom>
-            <a:solidFill>
-              <a:schemeClr val="accent1">
-                <a:lumMod val="40000"/>
-                <a:lumOff val="60000"/>
-              </a:schemeClr>
-            </a:solidFill>
-          </p:spPr>
-          <p:style>
-            <a:lnRef idx="2">
-              <a:schemeClr val="accent1">
-                <a:shade val="50000"/>
-              </a:schemeClr>
-            </a:lnRef>
-            <a:fillRef idx="1">
-              <a:schemeClr val="accent1"/>
-            </a:fillRef>
-            <a:effectRef idx="0">
-              <a:schemeClr val="accent1"/>
-            </a:effectRef>
-            <a:fontRef idx="minor">
-              <a:schemeClr val="lt1"/>
-            </a:fontRef>
-          </p:style>
-          <p:txBody>
-            <a:bodyPr rtlCol="1" anchor="ctr"/>
-            <a:lstStyle/>
-            <a:p>
-              <a:pPr algn="ctr"/>
-              <a:endParaRPr lang="he-IL"/>
-            </a:p>
-          </p:txBody>
-        </p:sp>
-        <p:pic>
-          <p:nvPicPr>
-            <p:cNvPr id="25" name="גרפיקה 24" descr="תיבת סימון עם v עם מילוי מלא">
-              <a:extLst>
-                <a:ext uri="{FF2B5EF4-FFF2-40B4-BE49-F238E27FC236}">
-                  <a16:creationId xmlns:a16="http://schemas.microsoft.com/office/drawing/2014/main" id="{921415AC-5EAC-4C07-9456-75F7C0C1B7E1}"/>
-                </a:ext>
-              </a:extLst>
-            </p:cNvPr>
-            <p:cNvPicPr>
-              <a:picLocks noChangeAspect="1"/>
-            </p:cNvPicPr>
-            <p:nvPr/>
-          </p:nvPicPr>
-          <p:blipFill>
-            <a:blip r:embed="rId2">
-              <a:extLst>
-                <a:ext uri="{28A0092B-C50C-407E-A947-70E740481C1C}">
-                  <a14:useLocalDpi xmlns:a14="http://schemas.microsoft.com/office/drawing/2010/main" val="0"/>
-                </a:ext>
-                <a:ext uri="{96DAC541-7B7A-43D3-8B79-37D633B846F1}">
-                  <asvg:svgBlip xmlns:asvg="http://schemas.microsoft.com/office/drawing/2016/SVG/main" r:embed="rId3"/>
-                </a:ext>
-              </a:extLst>
-            </a:blip>
-            <a:stretch>
-              <a:fillRect/>
-            </a:stretch>
-          </p:blipFill>
-          <p:spPr>
-            <a:xfrm>
-              <a:off x="5221983" y="3429000"/>
-              <a:ext cx="218114" cy="218114"/>
-            </a:xfrm>
-            <a:prstGeom prst="rect">
-              <a:avLst/>
-            </a:prstGeom>
-          </p:spPr>
-        </p:pic>
-      </p:grpSp>
-      <p:grpSp>
-        <p:nvGrpSpPr>
-          <p:cNvPr id="26" name="קבוצה 25">
-            <a:extLst>
-              <a:ext uri="{FF2B5EF4-FFF2-40B4-BE49-F238E27FC236}">
-                <a16:creationId xmlns:a16="http://schemas.microsoft.com/office/drawing/2014/main" id="{0CD79C66-6C6F-4043-B9B8-848914613CD8}"/>
-              </a:ext>
-            </a:extLst>
-          </p:cNvPr>
-          <p:cNvGrpSpPr/>
-          <p:nvPr/>
-        </p:nvGrpSpPr>
-        <p:grpSpPr>
-          <a:xfrm>
-            <a:off x="1272803" y="4661579"/>
-            <a:ext cx="292963" cy="218114"/>
-            <a:chOff x="5184559" y="3429000"/>
-            <a:chExt cx="292963" cy="218114"/>
-          </a:xfrm>
-        </p:grpSpPr>
-        <p:sp>
-          <p:nvSpPr>
-            <p:cNvPr id="27" name="אליפסה 26">
-              <a:extLst>
-                <a:ext uri="{FF2B5EF4-FFF2-40B4-BE49-F238E27FC236}">
-                  <a16:creationId xmlns:a16="http://schemas.microsoft.com/office/drawing/2014/main" id="{FBD745B8-D69D-4700-88B2-7A307E2C5EE0}"/>
-                </a:ext>
-              </a:extLst>
-            </p:cNvPr>
-            <p:cNvSpPr/>
-            <p:nvPr/>
-          </p:nvSpPr>
-          <p:spPr>
-            <a:xfrm>
-              <a:off x="5184559" y="3429000"/>
-              <a:ext cx="292963" cy="218114"/>
-            </a:xfrm>
-            <a:prstGeom prst="ellipse">
-              <a:avLst/>
-            </a:prstGeom>
-            <a:solidFill>
-              <a:schemeClr val="accent1">
-                <a:lumMod val="40000"/>
-                <a:lumOff val="60000"/>
-              </a:schemeClr>
-            </a:solidFill>
-          </p:spPr>
-          <p:style>
-            <a:lnRef idx="2">
-              <a:schemeClr val="accent1">
-                <a:shade val="50000"/>
-              </a:schemeClr>
-            </a:lnRef>
-            <a:fillRef idx="1">
-              <a:schemeClr val="accent1"/>
-            </a:fillRef>
-            <a:effectRef idx="0">
-              <a:schemeClr val="accent1"/>
-            </a:effectRef>
-            <a:fontRef idx="minor">
-              <a:schemeClr val="lt1"/>
-            </a:fontRef>
-          </p:style>
-          <p:txBody>
-            <a:bodyPr rtlCol="1" anchor="ctr"/>
-            <a:lstStyle/>
-            <a:p>
-              <a:pPr algn="ctr"/>
-              <a:endParaRPr lang="he-IL"/>
-            </a:p>
-          </p:txBody>
-        </p:sp>
-        <p:pic>
-          <p:nvPicPr>
-            <p:cNvPr id="28" name="גרפיקה 27" descr="תיבת סימון עם v עם מילוי מלא">
-              <a:extLst>
-                <a:ext uri="{FF2B5EF4-FFF2-40B4-BE49-F238E27FC236}">
-                  <a16:creationId xmlns:a16="http://schemas.microsoft.com/office/drawing/2014/main" id="{FB70EE22-9A38-40E9-AFD2-6F95D0587232}"/>
-                </a:ext>
-              </a:extLst>
-            </p:cNvPr>
-            <p:cNvPicPr>
-              <a:picLocks noChangeAspect="1"/>
-            </p:cNvPicPr>
-            <p:nvPr/>
-          </p:nvPicPr>
-          <p:blipFill>
-            <a:blip r:embed="rId2">
-              <a:extLst>
-                <a:ext uri="{28A0092B-C50C-407E-A947-70E740481C1C}">
-                  <a14:useLocalDpi xmlns:a14="http://schemas.microsoft.com/office/drawing/2010/main" val="0"/>
-                </a:ext>
-                <a:ext uri="{96DAC541-7B7A-43D3-8B79-37D633B846F1}">
-                  <asvg:svgBlip xmlns:asvg="http://schemas.microsoft.com/office/drawing/2016/SVG/main" r:embed="rId3"/>
-                </a:ext>
-              </a:extLst>
-            </a:blip>
-            <a:stretch>
-              <a:fillRect/>
-            </a:stretch>
-          </p:blipFill>
-          <p:spPr>
-            <a:xfrm>
-              <a:off x="5221983" y="3429000"/>
-              <a:ext cx="218114" cy="218114"/>
-            </a:xfrm>
-            <a:prstGeom prst="rect">
-              <a:avLst/>
-            </a:prstGeom>
-          </p:spPr>
-        </p:pic>
-      </p:grpSp>
-      <p:sp>
-        <p:nvSpPr>
           <p:cNvPr id="35" name="כוכב: 5 פינות 34">
-            <a:hlinkClick r:id="rId4" action="ppaction://hlinksldjump"/>
+            <a:hlinkClick r:id="rId2" action="ppaction://hlinksldjump"/>
             <a:extLst>
               <a:ext uri="{FF2B5EF4-FFF2-40B4-BE49-F238E27FC236}">
                 <a16:creationId xmlns:a16="http://schemas.microsoft.com/office/drawing/2014/main" id="{22644B8D-804A-40AD-90A7-5936DA452962}"/>
@@ -7826,13 +7441,13 @@
             <p:nvPr/>
           </p:nvPicPr>
           <p:blipFill>
-            <a:blip r:embed="rId2">
+            <a:blip r:embed="rId3">
               <a:extLst>
                 <a:ext uri="{28A0092B-C50C-407E-A947-70E740481C1C}">
                   <a14:useLocalDpi xmlns:a14="http://schemas.microsoft.com/office/drawing/2010/main" val="0"/>
                 </a:ext>
                 <a:ext uri="{96DAC541-7B7A-43D3-8B79-37D633B846F1}">
-                  <asvg:svgBlip xmlns:asvg="http://schemas.microsoft.com/office/drawing/2016/SVG/main" r:embed="rId3"/>
+                  <asvg:svgBlip xmlns:asvg="http://schemas.microsoft.com/office/drawing/2016/SVG/main" r:embed="rId4"/>
                 </a:ext>
               </a:extLst>
             </a:blip>
@@ -7938,13 +7553,13 @@
             <p:nvPr/>
           </p:nvPicPr>
           <p:blipFill>
-            <a:blip r:embed="rId2">
+            <a:blip r:embed="rId3">
               <a:extLst>
                 <a:ext uri="{28A0092B-C50C-407E-A947-70E740481C1C}">
                   <a14:useLocalDpi xmlns:a14="http://schemas.microsoft.com/office/drawing/2010/main" val="0"/>
                 </a:ext>
                 <a:ext uri="{96DAC541-7B7A-43D3-8B79-37D633B846F1}">
-                  <asvg:svgBlip xmlns:asvg="http://schemas.microsoft.com/office/drawing/2016/SVG/main" r:embed="rId3"/>
+                  <asvg:svgBlip xmlns:asvg="http://schemas.microsoft.com/office/drawing/2016/SVG/main" r:embed="rId4"/>
                 </a:ext>
               </a:extLst>
             </a:blip>
@@ -8050,125 +7665,13 @@
             <p:nvPr/>
           </p:nvPicPr>
           <p:blipFill>
-            <a:blip r:embed="rId2">
+            <a:blip r:embed="rId3">
               <a:extLst>
                 <a:ext uri="{28A0092B-C50C-407E-A947-70E740481C1C}">
                   <a14:useLocalDpi xmlns:a14="http://schemas.microsoft.com/office/drawing/2010/main" val="0"/>
                 </a:ext>
                 <a:ext uri="{96DAC541-7B7A-43D3-8B79-37D633B846F1}">
-                  <asvg:svgBlip xmlns:asvg="http://schemas.microsoft.com/office/drawing/2016/SVG/main" r:embed="rId3"/>
-                </a:ext>
-              </a:extLst>
-            </a:blip>
-            <a:stretch>
-              <a:fillRect/>
-            </a:stretch>
-          </p:blipFill>
-          <p:spPr>
-            <a:xfrm>
-              <a:off x="5221983" y="3429000"/>
-              <a:ext cx="218114" cy="218114"/>
-            </a:xfrm>
-            <a:prstGeom prst="rect">
-              <a:avLst/>
-            </a:prstGeom>
-          </p:spPr>
-        </p:pic>
-      </p:grpSp>
-      <p:grpSp>
-        <p:nvGrpSpPr>
-          <p:cNvPr id="42" name="קבוצה 41">
-            <a:extLst>
-              <a:ext uri="{FF2B5EF4-FFF2-40B4-BE49-F238E27FC236}">
-                <a16:creationId xmlns:a16="http://schemas.microsoft.com/office/drawing/2014/main" id="{4CE89F1F-99B4-4300-9616-8318DC70AC6C}"/>
-              </a:ext>
-            </a:extLst>
-          </p:cNvPr>
-          <p:cNvGrpSpPr/>
-          <p:nvPr/>
-        </p:nvGrpSpPr>
-        <p:grpSpPr>
-          <a:xfrm>
-            <a:off x="1683784" y="4294083"/>
-            <a:ext cx="292963" cy="218114"/>
-            <a:chOff x="5184559" y="3429000"/>
-            <a:chExt cx="292963" cy="218114"/>
-          </a:xfrm>
-        </p:grpSpPr>
-        <p:sp>
-          <p:nvSpPr>
-            <p:cNvPr id="43" name="אליפסה 42">
-              <a:extLst>
-                <a:ext uri="{FF2B5EF4-FFF2-40B4-BE49-F238E27FC236}">
-                  <a16:creationId xmlns:a16="http://schemas.microsoft.com/office/drawing/2014/main" id="{6F8A7F16-0C8E-40D2-AE8E-54A6B785384E}"/>
-                </a:ext>
-              </a:extLst>
-            </p:cNvPr>
-            <p:cNvSpPr/>
-            <p:nvPr/>
-          </p:nvSpPr>
-          <p:spPr>
-            <a:xfrm>
-              <a:off x="5184559" y="3429000"/>
-              <a:ext cx="292963" cy="218114"/>
-            </a:xfrm>
-            <a:prstGeom prst="ellipse">
-              <a:avLst/>
-            </a:prstGeom>
-            <a:solidFill>
-              <a:schemeClr val="accent1">
-                <a:lumMod val="40000"/>
-                <a:lumOff val="60000"/>
-              </a:schemeClr>
-            </a:solidFill>
-          </p:spPr>
-          <p:style>
-            <a:lnRef idx="2">
-              <a:schemeClr val="accent1">
-                <a:shade val="50000"/>
-              </a:schemeClr>
-            </a:lnRef>
-            <a:fillRef idx="1">
-              <a:schemeClr val="accent1"/>
-            </a:fillRef>
-            <a:effectRef idx="0">
-              <a:schemeClr val="accent1"/>
-            </a:effectRef>
-            <a:fontRef idx="minor">
-              <a:schemeClr val="lt1"/>
-            </a:fontRef>
-          </p:style>
-          <p:txBody>
-            <a:bodyPr rtlCol="1" anchor="ctr"/>
-            <a:lstStyle/>
-            <a:p>
-              <a:pPr algn="ctr"/>
-              <a:endParaRPr lang="he-IL"/>
-            </a:p>
-          </p:txBody>
-        </p:sp>
-        <p:pic>
-          <p:nvPicPr>
-            <p:cNvPr id="44" name="גרפיקה 43" descr="תיבת סימון עם v עם מילוי מלא">
-              <a:extLst>
-                <a:ext uri="{FF2B5EF4-FFF2-40B4-BE49-F238E27FC236}">
-                  <a16:creationId xmlns:a16="http://schemas.microsoft.com/office/drawing/2014/main" id="{76857961-642B-40C0-BA1E-578D8C334B4E}"/>
-                </a:ext>
-              </a:extLst>
-            </p:cNvPr>
-            <p:cNvPicPr>
-              <a:picLocks noChangeAspect="1"/>
-            </p:cNvPicPr>
-            <p:nvPr/>
-          </p:nvPicPr>
-          <p:blipFill>
-            <a:blip r:embed="rId2">
-              <a:extLst>
-                <a:ext uri="{28A0092B-C50C-407E-A947-70E740481C1C}">
-                  <a14:useLocalDpi xmlns:a14="http://schemas.microsoft.com/office/drawing/2010/main" val="0"/>
-                </a:ext>
-                <a:ext uri="{96DAC541-7B7A-43D3-8B79-37D633B846F1}">
-                  <asvg:svgBlip xmlns:asvg="http://schemas.microsoft.com/office/drawing/2016/SVG/main" r:embed="rId3"/>
+                  <asvg:svgBlip xmlns:asvg="http://schemas.microsoft.com/office/drawing/2016/SVG/main" r:embed="rId4"/>
                 </a:ext>
               </a:extLst>
             </a:blip>

</xml_diff>

<commit_message>
updated Academy Award DB web skach.pptx
</commit_message>
<xml_diff>
--- a/Academy Award DB web skach.pptx
+++ b/Academy Award DB web skach.pptx
@@ -8,16 +8,16 @@
     <p:notesMasterId r:id="rId12"/>
   </p:notesMasterIdLst>
   <p:sldIdLst>
-    <p:sldId id="256" r:id="rId2"/>
-    <p:sldId id="257" r:id="rId3"/>
-    <p:sldId id="259" r:id="rId4"/>
-    <p:sldId id="272" r:id="rId5"/>
-    <p:sldId id="258" r:id="rId6"/>
-    <p:sldId id="263" r:id="rId7"/>
-    <p:sldId id="267" r:id="rId8"/>
-    <p:sldId id="268" r:id="rId9"/>
-    <p:sldId id="271" r:id="rId10"/>
-    <p:sldId id="270" r:id="rId11"/>
+    <p:sldId id="270" r:id="rId2"/>
+    <p:sldId id="256" r:id="rId3"/>
+    <p:sldId id="257" r:id="rId4"/>
+    <p:sldId id="259" r:id="rId5"/>
+    <p:sldId id="272" r:id="rId6"/>
+    <p:sldId id="258" r:id="rId7"/>
+    <p:sldId id="263" r:id="rId8"/>
+    <p:sldId id="267" r:id="rId9"/>
+    <p:sldId id="268" r:id="rId10"/>
+    <p:sldId id="271" r:id="rId11"/>
   </p:sldIdLst>
   <p:sldSz cx="12192000" cy="6858000"/>
   <p:notesSz cx="6858000" cy="9144000"/>
@@ -558,7 +558,7 @@
           <a:p>
             <a:fld id="{59CE1EA4-5F39-4A8A-ABE8-CC33DEE25DF1}" type="slidenum">
               <a:rPr lang="he-IL" smtClean="0"/>
-              <a:t>3</a:t>
+              <a:t>4</a:t>
             </a:fld>
             <a:endParaRPr lang="he-IL"/>
           </a:p>
@@ -662,7 +662,7 @@
           <a:p>
             <a:fld id="{59CE1EA4-5F39-4A8A-ABE8-CC33DEE25DF1}" type="slidenum">
               <a:rPr lang="he-IL" smtClean="0"/>
-              <a:t>4</a:t>
+              <a:t>5</a:t>
             </a:fld>
             <a:endParaRPr lang="he-IL"/>
           </a:p>
@@ -766,7 +766,7 @@
           <a:p>
             <a:fld id="{59CE1EA4-5F39-4A8A-ABE8-CC33DEE25DF1}" type="slidenum">
               <a:rPr lang="he-IL" smtClean="0"/>
-              <a:t>6</a:t>
+              <a:t>7</a:t>
             </a:fld>
             <a:endParaRPr lang="he-IL"/>
           </a:p>
@@ -4004,6 +4004,909 @@
           <p:cNvPr id="2" name="כותרת 1">
             <a:extLst>
               <a:ext uri="{FF2B5EF4-FFF2-40B4-BE49-F238E27FC236}">
+                <a16:creationId xmlns:a16="http://schemas.microsoft.com/office/drawing/2014/main" id="{10BBC13D-BE74-4224-84A7-7E3A62F682C9}"/>
+              </a:ext>
+            </a:extLst>
+          </p:cNvPr>
+          <p:cNvSpPr>
+            <a:spLocks noGrp="1"/>
+          </p:cNvSpPr>
+          <p:nvPr>
+            <p:ph type="title"/>
+          </p:nvPr>
+        </p:nvSpPr>
+        <p:spPr/>
+        <p:txBody>
+          <a:bodyPr/>
+          <a:lstStyle/>
+          <a:p>
+            <a:pPr algn="l" rtl="0"/>
+            <a:r>
+              <a:rPr lang="en-US" dirty="0"/>
+              <a:t>info</a:t>
+            </a:r>
+            <a:endParaRPr lang="he-IL" dirty="0"/>
+          </a:p>
+        </p:txBody>
+      </p:sp>
+      <p:sp>
+        <p:nvSpPr>
+          <p:cNvPr id="11" name="מציין מיקום תוכן 2">
+            <a:extLst>
+              <a:ext uri="{FF2B5EF4-FFF2-40B4-BE49-F238E27FC236}">
+                <a16:creationId xmlns:a16="http://schemas.microsoft.com/office/drawing/2014/main" id="{FC1C24A8-91FC-4837-A0F7-C77BC840BC80}"/>
+              </a:ext>
+            </a:extLst>
+          </p:cNvPr>
+          <p:cNvSpPr txBox="1">
+            <a:spLocks/>
+          </p:cNvSpPr>
+          <p:nvPr/>
+        </p:nvSpPr>
+        <p:spPr>
+          <a:xfrm>
+            <a:off x="5960425" y="1532376"/>
+            <a:ext cx="3902476" cy="2933091"/>
+          </a:xfrm>
+          <a:prstGeom prst="rect">
+            <a:avLst/>
+          </a:prstGeom>
+        </p:spPr>
+        <p:txBody>
+          <a:bodyPr vert="horz" lIns="91440" tIns="45720" rIns="91440" bIns="45720" rtlCol="1">
+            <a:normAutofit/>
+          </a:bodyPr>
+          <a:lstStyle>
+            <a:lvl1pPr marL="228600" indent="-228600" algn="r" defTabSz="914400" rtl="1" eaLnBrk="1" latinLnBrk="0" hangingPunct="1">
+              <a:lnSpc>
+                <a:spcPct val="90000"/>
+              </a:lnSpc>
+              <a:spcBef>
+                <a:spcPts val="1000"/>
+              </a:spcBef>
+              <a:buFont typeface="Arial" panose="020B0604020202020204" pitchFamily="34" charset="0"/>
+              <a:buChar char="•"/>
+              <a:defRPr sz="2800" kern="1200">
+                <a:solidFill>
+                  <a:schemeClr val="tx1"/>
+                </a:solidFill>
+                <a:latin typeface="+mn-lt"/>
+                <a:ea typeface="+mn-ea"/>
+                <a:cs typeface="+mn-cs"/>
+              </a:defRPr>
+            </a:lvl1pPr>
+            <a:lvl2pPr marL="685800" indent="-228600" algn="r" defTabSz="914400" rtl="1" eaLnBrk="1" latinLnBrk="0" hangingPunct="1">
+              <a:lnSpc>
+                <a:spcPct val="90000"/>
+              </a:lnSpc>
+              <a:spcBef>
+                <a:spcPts val="500"/>
+              </a:spcBef>
+              <a:buFont typeface="Arial" panose="020B0604020202020204" pitchFamily="34" charset="0"/>
+              <a:buChar char="•"/>
+              <a:defRPr sz="2400" kern="1200">
+                <a:solidFill>
+                  <a:schemeClr val="tx1"/>
+                </a:solidFill>
+                <a:latin typeface="+mn-lt"/>
+                <a:ea typeface="+mn-ea"/>
+                <a:cs typeface="+mn-cs"/>
+              </a:defRPr>
+            </a:lvl2pPr>
+            <a:lvl3pPr marL="1143000" indent="-228600" algn="r" defTabSz="914400" rtl="1" eaLnBrk="1" latinLnBrk="0" hangingPunct="1">
+              <a:lnSpc>
+                <a:spcPct val="90000"/>
+              </a:lnSpc>
+              <a:spcBef>
+                <a:spcPts val="500"/>
+              </a:spcBef>
+              <a:buFont typeface="Arial" panose="020B0604020202020204" pitchFamily="34" charset="0"/>
+              <a:buChar char="•"/>
+              <a:defRPr sz="2000" kern="1200">
+                <a:solidFill>
+                  <a:schemeClr val="tx1"/>
+                </a:solidFill>
+                <a:latin typeface="+mn-lt"/>
+                <a:ea typeface="+mn-ea"/>
+                <a:cs typeface="+mn-cs"/>
+              </a:defRPr>
+            </a:lvl3pPr>
+            <a:lvl4pPr marL="1600200" indent="-228600" algn="r" defTabSz="914400" rtl="1" eaLnBrk="1" latinLnBrk="0" hangingPunct="1">
+              <a:lnSpc>
+                <a:spcPct val="90000"/>
+              </a:lnSpc>
+              <a:spcBef>
+                <a:spcPts val="500"/>
+              </a:spcBef>
+              <a:buFont typeface="Arial" panose="020B0604020202020204" pitchFamily="34" charset="0"/>
+              <a:buChar char="•"/>
+              <a:defRPr sz="1800" kern="1200">
+                <a:solidFill>
+                  <a:schemeClr val="tx1"/>
+                </a:solidFill>
+                <a:latin typeface="+mn-lt"/>
+                <a:ea typeface="+mn-ea"/>
+                <a:cs typeface="+mn-cs"/>
+              </a:defRPr>
+            </a:lvl4pPr>
+            <a:lvl5pPr marL="2057400" indent="-228600" algn="r" defTabSz="914400" rtl="1" eaLnBrk="1" latinLnBrk="0" hangingPunct="1">
+              <a:lnSpc>
+                <a:spcPct val="90000"/>
+              </a:lnSpc>
+              <a:spcBef>
+                <a:spcPts val="500"/>
+              </a:spcBef>
+              <a:buFont typeface="Arial" panose="020B0604020202020204" pitchFamily="34" charset="0"/>
+              <a:buChar char="•"/>
+              <a:defRPr sz="1800" kern="1200">
+                <a:solidFill>
+                  <a:schemeClr val="tx1"/>
+                </a:solidFill>
+                <a:latin typeface="+mn-lt"/>
+                <a:ea typeface="+mn-ea"/>
+                <a:cs typeface="+mn-cs"/>
+              </a:defRPr>
+            </a:lvl5pPr>
+            <a:lvl6pPr marL="2514600" indent="-228600" algn="r" defTabSz="914400" rtl="1" eaLnBrk="1" latinLnBrk="0" hangingPunct="1">
+              <a:lnSpc>
+                <a:spcPct val="90000"/>
+              </a:lnSpc>
+              <a:spcBef>
+                <a:spcPts val="500"/>
+              </a:spcBef>
+              <a:buFont typeface="Arial" panose="020B0604020202020204" pitchFamily="34" charset="0"/>
+              <a:buChar char="•"/>
+              <a:defRPr sz="1800" kern="1200">
+                <a:solidFill>
+                  <a:schemeClr val="tx1"/>
+                </a:solidFill>
+                <a:latin typeface="+mn-lt"/>
+                <a:ea typeface="+mn-ea"/>
+                <a:cs typeface="+mn-cs"/>
+              </a:defRPr>
+            </a:lvl6pPr>
+            <a:lvl7pPr marL="2971800" indent="-228600" algn="r" defTabSz="914400" rtl="1" eaLnBrk="1" latinLnBrk="0" hangingPunct="1">
+              <a:lnSpc>
+                <a:spcPct val="90000"/>
+              </a:lnSpc>
+              <a:spcBef>
+                <a:spcPts val="500"/>
+              </a:spcBef>
+              <a:buFont typeface="Arial" panose="020B0604020202020204" pitchFamily="34" charset="0"/>
+              <a:buChar char="•"/>
+              <a:defRPr sz="1800" kern="1200">
+                <a:solidFill>
+                  <a:schemeClr val="tx1"/>
+                </a:solidFill>
+                <a:latin typeface="+mn-lt"/>
+                <a:ea typeface="+mn-ea"/>
+                <a:cs typeface="+mn-cs"/>
+              </a:defRPr>
+            </a:lvl7pPr>
+            <a:lvl8pPr marL="3429000" indent="-228600" algn="r" defTabSz="914400" rtl="1" eaLnBrk="1" latinLnBrk="0" hangingPunct="1">
+              <a:lnSpc>
+                <a:spcPct val="90000"/>
+              </a:lnSpc>
+              <a:spcBef>
+                <a:spcPts val="500"/>
+              </a:spcBef>
+              <a:buFont typeface="Arial" panose="020B0604020202020204" pitchFamily="34" charset="0"/>
+              <a:buChar char="•"/>
+              <a:defRPr sz="1800" kern="1200">
+                <a:solidFill>
+                  <a:schemeClr val="tx1"/>
+                </a:solidFill>
+                <a:latin typeface="+mn-lt"/>
+                <a:ea typeface="+mn-ea"/>
+                <a:cs typeface="+mn-cs"/>
+              </a:defRPr>
+            </a:lvl8pPr>
+            <a:lvl9pPr marL="3886200" indent="-228600" algn="r" defTabSz="914400" rtl="1" eaLnBrk="1" latinLnBrk="0" hangingPunct="1">
+              <a:lnSpc>
+                <a:spcPct val="90000"/>
+              </a:lnSpc>
+              <a:spcBef>
+                <a:spcPts val="500"/>
+              </a:spcBef>
+              <a:buFont typeface="Arial" panose="020B0604020202020204" pitchFamily="34" charset="0"/>
+              <a:buChar char="•"/>
+              <a:defRPr sz="1800" kern="1200">
+                <a:solidFill>
+                  <a:schemeClr val="tx1"/>
+                </a:solidFill>
+                <a:latin typeface="+mn-lt"/>
+                <a:ea typeface="+mn-ea"/>
+                <a:cs typeface="+mn-cs"/>
+              </a:defRPr>
+            </a:lvl9pPr>
+          </a:lstStyle>
+          <a:p>
+            <a:pPr marL="457200" lvl="1" indent="0" algn="l" rtl="0">
+              <a:buFont typeface="Arial" panose="020B0604020202020204" pitchFamily="34" charset="0"/>
+              <a:buNone/>
+            </a:pPr>
+            <a:endParaRPr lang="en-US" dirty="0"/>
+          </a:p>
+          <a:p>
+            <a:pPr marL="914400" lvl="2" indent="0" algn="l" rtl="0">
+              <a:buNone/>
+            </a:pPr>
+            <a:endParaRPr lang="en-US" dirty="0"/>
+          </a:p>
+          <a:p>
+            <a:pPr lvl="2" algn="l" rtl="0"/>
+            <a:endParaRPr lang="he-IL" dirty="0"/>
+          </a:p>
+        </p:txBody>
+      </p:sp>
+      <p:grpSp>
+        <p:nvGrpSpPr>
+          <p:cNvPr id="12" name="קבוצה 11">
+            <a:extLst>
+              <a:ext uri="{FF2B5EF4-FFF2-40B4-BE49-F238E27FC236}">
+                <a16:creationId xmlns:a16="http://schemas.microsoft.com/office/drawing/2014/main" id="{808029D0-729B-4660-9E0C-35FFB46402E7}"/>
+              </a:ext>
+            </a:extLst>
+          </p:cNvPr>
+          <p:cNvGrpSpPr/>
+          <p:nvPr/>
+        </p:nvGrpSpPr>
+        <p:grpSpPr>
+          <a:xfrm>
+            <a:off x="-75908" y="180459"/>
+            <a:ext cx="5257507" cy="369332"/>
+            <a:chOff x="998290" y="427839"/>
+            <a:chExt cx="4990632" cy="369332"/>
+          </a:xfrm>
+        </p:grpSpPr>
+        <p:sp>
+          <p:nvSpPr>
+            <p:cNvPr id="13" name="תיבת טקסט 12">
+              <a:extLst>
+                <a:ext uri="{FF2B5EF4-FFF2-40B4-BE49-F238E27FC236}">
+                  <a16:creationId xmlns:a16="http://schemas.microsoft.com/office/drawing/2014/main" id="{6BEFADBA-2B23-4DF0-8AE7-A1E288474E2B}"/>
+                </a:ext>
+              </a:extLst>
+            </p:cNvPr>
+            <p:cNvSpPr txBox="1"/>
+            <p:nvPr/>
+          </p:nvSpPr>
+          <p:spPr>
+            <a:xfrm>
+              <a:off x="998290" y="427839"/>
+              <a:ext cx="780176" cy="369332"/>
+            </a:xfrm>
+            <a:prstGeom prst="rect">
+              <a:avLst/>
+            </a:prstGeom>
+            <a:noFill/>
+          </p:spPr>
+          <p:txBody>
+            <a:bodyPr wrap="square" rtlCol="1">
+              <a:spAutoFit/>
+            </a:bodyPr>
+            <a:lstStyle/>
+            <a:p>
+              <a:r>
+                <a:rPr lang="en-US" dirty="0">
+                  <a:hlinkClick r:id="rId2" action="ppaction://hlinksldjump"/>
+                </a:rPr>
+                <a:t>Home</a:t>
+              </a:r>
+              <a:endParaRPr lang="he-IL" dirty="0"/>
+            </a:p>
+          </p:txBody>
+        </p:sp>
+        <p:sp>
+          <p:nvSpPr>
+            <p:cNvPr id="14" name="תיבת טקסט 13">
+              <a:extLst>
+                <a:ext uri="{FF2B5EF4-FFF2-40B4-BE49-F238E27FC236}">
+                  <a16:creationId xmlns:a16="http://schemas.microsoft.com/office/drawing/2014/main" id="{BE111A8B-9EB1-471C-900A-8870E3D1BD20}"/>
+                </a:ext>
+              </a:extLst>
+            </p:cNvPr>
+            <p:cNvSpPr txBox="1"/>
+            <p:nvPr/>
+          </p:nvSpPr>
+          <p:spPr>
+            <a:xfrm>
+              <a:off x="1677799" y="427839"/>
+              <a:ext cx="1040234" cy="369332"/>
+            </a:xfrm>
+            <a:prstGeom prst="rect">
+              <a:avLst/>
+            </a:prstGeom>
+            <a:noFill/>
+          </p:spPr>
+          <p:txBody>
+            <a:bodyPr wrap="square" rtlCol="1">
+              <a:spAutoFit/>
+            </a:bodyPr>
+            <a:lstStyle/>
+            <a:p>
+              <a:r>
+                <a:rPr lang="en-US" dirty="0">
+                  <a:hlinkClick r:id="rId3" action="ppaction://hlinksldjump"/>
+                </a:rPr>
+                <a:t>Movies</a:t>
+              </a:r>
+              <a:endParaRPr lang="he-IL" dirty="0"/>
+            </a:p>
+          </p:txBody>
+        </p:sp>
+        <p:sp>
+          <p:nvSpPr>
+            <p:cNvPr id="15" name="תיבת טקסט 14">
+              <a:extLst>
+                <a:ext uri="{FF2B5EF4-FFF2-40B4-BE49-F238E27FC236}">
+                  <a16:creationId xmlns:a16="http://schemas.microsoft.com/office/drawing/2014/main" id="{79FBEAEA-AE39-44E6-BC07-F777EC3AEB9B}"/>
+                </a:ext>
+              </a:extLst>
+            </p:cNvPr>
+            <p:cNvSpPr txBox="1"/>
+            <p:nvPr/>
+          </p:nvSpPr>
+          <p:spPr>
+            <a:xfrm>
+              <a:off x="2836877" y="427839"/>
+              <a:ext cx="1040234" cy="369332"/>
+            </a:xfrm>
+            <a:prstGeom prst="rect">
+              <a:avLst/>
+            </a:prstGeom>
+            <a:noFill/>
+          </p:spPr>
+          <p:txBody>
+            <a:bodyPr wrap="square" rtlCol="1">
+              <a:spAutoFit/>
+            </a:bodyPr>
+            <a:lstStyle/>
+            <a:p>
+              <a:r>
+                <a:rPr lang="en-US" dirty="0">
+                  <a:hlinkClick r:id="rId4" action="ppaction://hlinksldjump"/>
+                </a:rPr>
+                <a:t>Persons</a:t>
+              </a:r>
+              <a:endParaRPr lang="he-IL" dirty="0"/>
+            </a:p>
+          </p:txBody>
+        </p:sp>
+        <p:sp>
+          <p:nvSpPr>
+            <p:cNvPr id="16" name="תיבת טקסט 15">
+              <a:extLst>
+                <a:ext uri="{FF2B5EF4-FFF2-40B4-BE49-F238E27FC236}">
+                  <a16:creationId xmlns:a16="http://schemas.microsoft.com/office/drawing/2014/main" id="{AB128095-E397-4249-8496-A82584975FA0}"/>
+                </a:ext>
+              </a:extLst>
+            </p:cNvPr>
+            <p:cNvSpPr txBox="1"/>
+            <p:nvPr/>
+          </p:nvSpPr>
+          <p:spPr>
+            <a:xfrm>
+              <a:off x="4028113" y="427839"/>
+              <a:ext cx="974521" cy="369332"/>
+            </a:xfrm>
+            <a:prstGeom prst="rect">
+              <a:avLst/>
+            </a:prstGeom>
+            <a:noFill/>
+          </p:spPr>
+          <p:txBody>
+            <a:bodyPr wrap="square" rtlCol="1">
+              <a:spAutoFit/>
+            </a:bodyPr>
+            <a:lstStyle/>
+            <a:p>
+              <a:r>
+                <a:rPr lang="en-US" dirty="0">
+                  <a:hlinkClick r:id="rId5" action="ppaction://hlinksldjump"/>
+                </a:rPr>
+                <a:t>Awards</a:t>
+              </a:r>
+              <a:endParaRPr lang="en-US" dirty="0"/>
+            </a:p>
+          </p:txBody>
+        </p:sp>
+        <p:sp>
+          <p:nvSpPr>
+            <p:cNvPr id="17" name="תיבת טקסט 16">
+              <a:extLst>
+                <a:ext uri="{FF2B5EF4-FFF2-40B4-BE49-F238E27FC236}">
+                  <a16:creationId xmlns:a16="http://schemas.microsoft.com/office/drawing/2014/main" id="{651448EC-1D79-455F-A51A-FB5289675C3C}"/>
+                </a:ext>
+              </a:extLst>
+            </p:cNvPr>
+            <p:cNvSpPr txBox="1"/>
+            <p:nvPr/>
+          </p:nvSpPr>
+          <p:spPr>
+            <a:xfrm>
+              <a:off x="5153636" y="427839"/>
+              <a:ext cx="835286" cy="369332"/>
+            </a:xfrm>
+            <a:prstGeom prst="rect">
+              <a:avLst/>
+            </a:prstGeom>
+            <a:noFill/>
+          </p:spPr>
+          <p:txBody>
+            <a:bodyPr wrap="square" rtlCol="1">
+              <a:spAutoFit/>
+            </a:bodyPr>
+            <a:lstStyle/>
+            <a:p>
+              <a:r>
+                <a:rPr lang="en-US" dirty="0">
+                  <a:hlinkClick r:id="rId6" action="ppaction://hlinksldjump"/>
+                </a:rPr>
+                <a:t>Genres</a:t>
+              </a:r>
+              <a:endParaRPr lang="en-US" dirty="0"/>
+            </a:p>
+          </p:txBody>
+        </p:sp>
+      </p:grpSp>
+      <p:sp>
+        <p:nvSpPr>
+          <p:cNvPr id="19" name="מציין מיקום תוכן 18">
+            <a:extLst>
+              <a:ext uri="{FF2B5EF4-FFF2-40B4-BE49-F238E27FC236}">
+                <a16:creationId xmlns:a16="http://schemas.microsoft.com/office/drawing/2014/main" id="{44A5C8D1-4B39-4303-B3A0-61B9917573B9}"/>
+              </a:ext>
+            </a:extLst>
+          </p:cNvPr>
+          <p:cNvSpPr>
+            <a:spLocks noGrp="1"/>
+          </p:cNvSpPr>
+          <p:nvPr>
+            <p:ph idx="1"/>
+          </p:nvPr>
+        </p:nvSpPr>
+        <p:spPr/>
+        <p:txBody>
+          <a:bodyPr>
+            <a:normAutofit/>
+          </a:bodyPr>
+          <a:lstStyle/>
+          <a:p>
+            <a:pPr marL="0" indent="0" algn="l" rtl="0">
+              <a:buNone/>
+            </a:pPr>
+            <a:r>
+              <a:rPr lang="en-US" dirty="0"/>
+              <a:t>This website is dedicated for the Academy Oscar Awards.</a:t>
+            </a:r>
+          </a:p>
+          <a:p>
+            <a:pPr marL="0" indent="0" algn="l" rtl="0">
+              <a:buNone/>
+            </a:pPr>
+            <a:r>
+              <a:rPr lang="en-US" dirty="0"/>
+              <a:t>Here one can search for movies, actors, actresses and directors that won this precious and rare award, and  other interesting information on this award.</a:t>
+            </a:r>
+          </a:p>
+          <a:p>
+            <a:pPr marL="0" indent="0" algn="l" rtl="0">
+              <a:buNone/>
+            </a:pPr>
+            <a:r>
+              <a:rPr lang="en-US" dirty="0"/>
+              <a:t>Try to navigate in the tabs above and find all the features we provide.</a:t>
+            </a:r>
+          </a:p>
+          <a:p>
+            <a:pPr marL="0" indent="0" algn="l" rtl="0">
+              <a:buNone/>
+            </a:pPr>
+            <a:endParaRPr lang="en-US" dirty="0"/>
+          </a:p>
+          <a:p>
+            <a:pPr marL="0" indent="0" algn="l" rtl="0">
+              <a:buNone/>
+            </a:pPr>
+            <a:r>
+              <a:rPr lang="en-US" dirty="0"/>
+              <a:t>Have fun!</a:t>
+            </a:r>
+          </a:p>
+          <a:p>
+            <a:pPr marL="0" indent="0" algn="l" rtl="0">
+              <a:buNone/>
+            </a:pPr>
+            <a:endParaRPr lang="en-US" dirty="0"/>
+          </a:p>
+          <a:p>
+            <a:pPr marL="0" indent="0" algn="l" rtl="0">
+              <a:buNone/>
+            </a:pPr>
+            <a:r>
+              <a:rPr lang="en-US" sz="1400" dirty="0"/>
+              <a:t>Made by Udi Ronen and Joe </a:t>
+            </a:r>
+            <a:r>
+              <a:rPr lang="en-US" sz="1400" dirty="0" err="1"/>
+              <a:t>Bahou</a:t>
+            </a:r>
+            <a:endParaRPr lang="he-IL" sz="1400" dirty="0"/>
+          </a:p>
+        </p:txBody>
+      </p:sp>
+    </p:spTree>
+    <p:extLst>
+      <p:ext uri="{BB962C8B-B14F-4D97-AF65-F5344CB8AC3E}">
+        <p14:creationId xmlns:p14="http://schemas.microsoft.com/office/powerpoint/2010/main" val="1294858795"/>
+      </p:ext>
+    </p:extLst>
+  </p:cSld>
+  <p:clrMapOvr>
+    <a:masterClrMapping/>
+  </p:clrMapOvr>
+</p:sld>
+</file>
+
+<file path=ppt/slides/slide10.xml><?xml version="1.0" encoding="utf-8"?>
+<p:sld xmlns:a="http://schemas.openxmlformats.org/drawingml/2006/main" xmlns:r="http://schemas.openxmlformats.org/officeDocument/2006/relationships" xmlns:p="http://schemas.openxmlformats.org/presentationml/2006/main">
+  <p:cSld>
+    <p:spTree>
+      <p:nvGrpSpPr>
+        <p:cNvPr id="1" name=""/>
+        <p:cNvGrpSpPr/>
+        <p:nvPr/>
+      </p:nvGrpSpPr>
+      <p:grpSpPr>
+        <a:xfrm>
+          <a:off x="0" y="0"/>
+          <a:ext cx="0" cy="0"/>
+          <a:chOff x="0" y="0"/>
+          <a:chExt cx="0" cy="0"/>
+        </a:xfrm>
+      </p:grpSpPr>
+      <p:sp>
+        <p:nvSpPr>
+          <p:cNvPr id="2" name="כותרת 1">
+            <a:extLst>
+              <a:ext uri="{FF2B5EF4-FFF2-40B4-BE49-F238E27FC236}">
+                <a16:creationId xmlns:a16="http://schemas.microsoft.com/office/drawing/2014/main" id="{E967B0A5-AFF0-498A-9D03-C06616935D95}"/>
+              </a:ext>
+            </a:extLst>
+          </p:cNvPr>
+          <p:cNvSpPr>
+            <a:spLocks noGrp="1"/>
+          </p:cNvSpPr>
+          <p:nvPr>
+            <p:ph type="title"/>
+          </p:nvPr>
+        </p:nvSpPr>
+        <p:spPr/>
+        <p:txBody>
+          <a:bodyPr/>
+          <a:lstStyle/>
+          <a:p>
+            <a:pPr algn="ctr"/>
+            <a:r>
+              <a:rPr lang="en-US" dirty="0"/>
+              <a:t>Genres</a:t>
+            </a:r>
+            <a:endParaRPr lang="he-IL" dirty="0"/>
+          </a:p>
+        </p:txBody>
+      </p:sp>
+      <p:sp>
+        <p:nvSpPr>
+          <p:cNvPr id="3" name="מציין מיקום תוכן 2">
+            <a:extLst>
+              <a:ext uri="{FF2B5EF4-FFF2-40B4-BE49-F238E27FC236}">
+                <a16:creationId xmlns:a16="http://schemas.microsoft.com/office/drawing/2014/main" id="{559ECD38-96E8-4337-BE8F-9485EBED3F79}"/>
+              </a:ext>
+            </a:extLst>
+          </p:cNvPr>
+          <p:cNvSpPr>
+            <a:spLocks noGrp="1"/>
+          </p:cNvSpPr>
+          <p:nvPr>
+            <p:ph idx="1"/>
+          </p:nvPr>
+        </p:nvSpPr>
+        <p:spPr/>
+        <p:txBody>
+          <a:bodyPr/>
+          <a:lstStyle/>
+          <a:p>
+            <a:pPr marL="0" indent="0" algn="l" rtl="0">
+              <a:buNone/>
+            </a:pPr>
+            <a:r>
+              <a:rPr lang="en-US" dirty="0"/>
+              <a:t>Number of Oscar Nominations and Wins for Each Genre</a:t>
+            </a:r>
+          </a:p>
+          <a:p>
+            <a:pPr marL="0" indent="0" algn="l" rtl="0">
+              <a:buNone/>
+            </a:pPr>
+            <a:r>
+              <a:rPr lang="en-US" dirty="0"/>
+              <a:t>List of all genres</a:t>
+            </a:r>
+          </a:p>
+          <a:p>
+            <a:pPr lvl="1" algn="l" rtl="0"/>
+            <a:r>
+              <a:rPr lang="en-US" dirty="0"/>
+              <a:t>genre name</a:t>
+            </a:r>
+          </a:p>
+          <a:p>
+            <a:pPr lvl="1" algn="l" rtl="0"/>
+            <a:r>
+              <a:rPr lang="en-US" dirty="0"/>
+              <a:t>number of nominations</a:t>
+            </a:r>
+          </a:p>
+          <a:p>
+            <a:pPr lvl="1" algn="l" rtl="0"/>
+            <a:r>
+              <a:rPr lang="en-US" dirty="0"/>
+              <a:t>number of wins</a:t>
+            </a:r>
+          </a:p>
+          <a:p>
+            <a:pPr lvl="1" algn="l" rtl="0"/>
+            <a:endParaRPr lang="he-IL" dirty="0"/>
+          </a:p>
+        </p:txBody>
+      </p:sp>
+      <p:grpSp>
+        <p:nvGrpSpPr>
+          <p:cNvPr id="4" name="קבוצה 3">
+            <a:extLst>
+              <a:ext uri="{FF2B5EF4-FFF2-40B4-BE49-F238E27FC236}">
+                <a16:creationId xmlns:a16="http://schemas.microsoft.com/office/drawing/2014/main" id="{047263FD-69CE-4456-AB4F-0C259179E0AB}"/>
+              </a:ext>
+            </a:extLst>
+          </p:cNvPr>
+          <p:cNvGrpSpPr/>
+          <p:nvPr/>
+        </p:nvGrpSpPr>
+        <p:grpSpPr>
+          <a:xfrm>
+            <a:off x="-75908" y="180459"/>
+            <a:ext cx="5257507" cy="369332"/>
+            <a:chOff x="998290" y="427839"/>
+            <a:chExt cx="4990632" cy="369332"/>
+          </a:xfrm>
+        </p:grpSpPr>
+        <p:sp>
+          <p:nvSpPr>
+            <p:cNvPr id="5" name="תיבת טקסט 4">
+              <a:extLst>
+                <a:ext uri="{FF2B5EF4-FFF2-40B4-BE49-F238E27FC236}">
+                  <a16:creationId xmlns:a16="http://schemas.microsoft.com/office/drawing/2014/main" id="{B21E78C7-D469-4432-A126-5E3859D27EE4}"/>
+                </a:ext>
+              </a:extLst>
+            </p:cNvPr>
+            <p:cNvSpPr txBox="1"/>
+            <p:nvPr/>
+          </p:nvSpPr>
+          <p:spPr>
+            <a:xfrm>
+              <a:off x="998290" y="427839"/>
+              <a:ext cx="780176" cy="369332"/>
+            </a:xfrm>
+            <a:prstGeom prst="rect">
+              <a:avLst/>
+            </a:prstGeom>
+            <a:noFill/>
+          </p:spPr>
+          <p:txBody>
+            <a:bodyPr wrap="square" rtlCol="1">
+              <a:spAutoFit/>
+            </a:bodyPr>
+            <a:lstStyle/>
+            <a:p>
+              <a:r>
+                <a:rPr lang="en-US" dirty="0">
+                  <a:hlinkClick r:id="rId2" action="ppaction://hlinksldjump"/>
+                </a:rPr>
+                <a:t>Home</a:t>
+              </a:r>
+              <a:endParaRPr lang="he-IL" dirty="0"/>
+            </a:p>
+          </p:txBody>
+        </p:sp>
+        <p:sp>
+          <p:nvSpPr>
+            <p:cNvPr id="6" name="תיבת טקסט 5">
+              <a:extLst>
+                <a:ext uri="{FF2B5EF4-FFF2-40B4-BE49-F238E27FC236}">
+                  <a16:creationId xmlns:a16="http://schemas.microsoft.com/office/drawing/2014/main" id="{064648F6-714B-46B4-AF00-33FA8CA93D1D}"/>
+                </a:ext>
+              </a:extLst>
+            </p:cNvPr>
+            <p:cNvSpPr txBox="1"/>
+            <p:nvPr/>
+          </p:nvSpPr>
+          <p:spPr>
+            <a:xfrm>
+              <a:off x="1677799" y="427839"/>
+              <a:ext cx="1040234" cy="369332"/>
+            </a:xfrm>
+            <a:prstGeom prst="rect">
+              <a:avLst/>
+            </a:prstGeom>
+            <a:noFill/>
+          </p:spPr>
+          <p:txBody>
+            <a:bodyPr wrap="square" rtlCol="1">
+              <a:spAutoFit/>
+            </a:bodyPr>
+            <a:lstStyle/>
+            <a:p>
+              <a:r>
+                <a:rPr lang="en-US" dirty="0">
+                  <a:hlinkClick r:id="rId3" action="ppaction://hlinksldjump"/>
+                </a:rPr>
+                <a:t>Movies</a:t>
+              </a:r>
+              <a:endParaRPr lang="he-IL" dirty="0"/>
+            </a:p>
+          </p:txBody>
+        </p:sp>
+        <p:sp>
+          <p:nvSpPr>
+            <p:cNvPr id="7" name="תיבת טקסט 6">
+              <a:extLst>
+                <a:ext uri="{FF2B5EF4-FFF2-40B4-BE49-F238E27FC236}">
+                  <a16:creationId xmlns:a16="http://schemas.microsoft.com/office/drawing/2014/main" id="{2C859A22-0919-4F52-88BB-041997416D19}"/>
+                </a:ext>
+              </a:extLst>
+            </p:cNvPr>
+            <p:cNvSpPr txBox="1"/>
+            <p:nvPr/>
+          </p:nvSpPr>
+          <p:spPr>
+            <a:xfrm>
+              <a:off x="2836877" y="427839"/>
+              <a:ext cx="1040234" cy="369332"/>
+            </a:xfrm>
+            <a:prstGeom prst="rect">
+              <a:avLst/>
+            </a:prstGeom>
+            <a:noFill/>
+          </p:spPr>
+          <p:txBody>
+            <a:bodyPr wrap="square" rtlCol="1">
+              <a:spAutoFit/>
+            </a:bodyPr>
+            <a:lstStyle/>
+            <a:p>
+              <a:r>
+                <a:rPr lang="en-US" dirty="0">
+                  <a:hlinkClick r:id="rId4" action="ppaction://hlinksldjump"/>
+                </a:rPr>
+                <a:t>Persons</a:t>
+              </a:r>
+              <a:endParaRPr lang="he-IL" dirty="0"/>
+            </a:p>
+          </p:txBody>
+        </p:sp>
+        <p:sp>
+          <p:nvSpPr>
+            <p:cNvPr id="8" name="תיבת טקסט 7">
+              <a:extLst>
+                <a:ext uri="{FF2B5EF4-FFF2-40B4-BE49-F238E27FC236}">
+                  <a16:creationId xmlns:a16="http://schemas.microsoft.com/office/drawing/2014/main" id="{71F3BD0E-7655-46B5-A6F9-CB6E47A7D8C5}"/>
+                </a:ext>
+              </a:extLst>
+            </p:cNvPr>
+            <p:cNvSpPr txBox="1"/>
+            <p:nvPr/>
+          </p:nvSpPr>
+          <p:spPr>
+            <a:xfrm>
+              <a:off x="4028113" y="427839"/>
+              <a:ext cx="974521" cy="369332"/>
+            </a:xfrm>
+            <a:prstGeom prst="rect">
+              <a:avLst/>
+            </a:prstGeom>
+            <a:noFill/>
+          </p:spPr>
+          <p:txBody>
+            <a:bodyPr wrap="square" rtlCol="1">
+              <a:spAutoFit/>
+            </a:bodyPr>
+            <a:lstStyle/>
+            <a:p>
+              <a:r>
+                <a:rPr lang="en-US" dirty="0">
+                  <a:hlinkClick r:id="rId5" action="ppaction://hlinksldjump"/>
+                </a:rPr>
+                <a:t>Awards</a:t>
+              </a:r>
+              <a:endParaRPr lang="en-US" dirty="0"/>
+            </a:p>
+          </p:txBody>
+        </p:sp>
+        <p:sp>
+          <p:nvSpPr>
+            <p:cNvPr id="9" name="תיבת טקסט 8">
+              <a:extLst>
+                <a:ext uri="{FF2B5EF4-FFF2-40B4-BE49-F238E27FC236}">
+                  <a16:creationId xmlns:a16="http://schemas.microsoft.com/office/drawing/2014/main" id="{613DDB66-0D6A-46AC-86DA-10F525536EDB}"/>
+                </a:ext>
+              </a:extLst>
+            </p:cNvPr>
+            <p:cNvSpPr txBox="1"/>
+            <p:nvPr/>
+          </p:nvSpPr>
+          <p:spPr>
+            <a:xfrm>
+              <a:off x="5153636" y="427839"/>
+              <a:ext cx="835286" cy="369332"/>
+            </a:xfrm>
+            <a:prstGeom prst="rect">
+              <a:avLst/>
+            </a:prstGeom>
+            <a:noFill/>
+          </p:spPr>
+          <p:txBody>
+            <a:bodyPr wrap="square" rtlCol="1">
+              <a:spAutoFit/>
+            </a:bodyPr>
+            <a:lstStyle/>
+            <a:p>
+              <a:r>
+                <a:rPr lang="en-US" dirty="0">
+                  <a:hlinkClick r:id="rId6" action="ppaction://hlinksldjump"/>
+                </a:rPr>
+                <a:t>Genres</a:t>
+              </a:r>
+              <a:endParaRPr lang="en-US" dirty="0"/>
+            </a:p>
+          </p:txBody>
+        </p:sp>
+      </p:grpSp>
+    </p:spTree>
+    <p:extLst>
+      <p:ext uri="{BB962C8B-B14F-4D97-AF65-F5344CB8AC3E}">
+        <p14:creationId xmlns:p14="http://schemas.microsoft.com/office/powerpoint/2010/main" val="25033684"/>
+      </p:ext>
+    </p:extLst>
+  </p:cSld>
+  <p:clrMapOvr>
+    <a:masterClrMapping/>
+  </p:clrMapOvr>
+</p:sld>
+</file>
+
+<file path=ppt/slides/slide2.xml><?xml version="1.0" encoding="utf-8"?>
+<p:sld xmlns:a="http://schemas.openxmlformats.org/drawingml/2006/main" xmlns:r="http://schemas.openxmlformats.org/officeDocument/2006/relationships" xmlns:p="http://schemas.openxmlformats.org/presentationml/2006/main">
+  <p:cSld>
+    <p:spTree>
+      <p:nvGrpSpPr>
+        <p:cNvPr id="1" name=""/>
+        <p:cNvGrpSpPr/>
+        <p:nvPr/>
+      </p:nvGrpSpPr>
+      <p:grpSpPr>
+        <a:xfrm>
+          <a:off x="0" y="0"/>
+          <a:ext cx="0" cy="0"/>
+          <a:chOff x="0" y="0"/>
+          <a:chExt cx="0" cy="0"/>
+        </a:xfrm>
+      </p:grpSpPr>
+      <p:sp>
+        <p:nvSpPr>
+          <p:cNvPr id="2" name="כותרת 1">
+            <a:extLst>
+              <a:ext uri="{FF2B5EF4-FFF2-40B4-BE49-F238E27FC236}">
                 <a16:creationId xmlns:a16="http://schemas.microsoft.com/office/drawing/2014/main" id="{84866166-7931-46C4-BDDE-8C2C476B0C08}"/>
               </a:ext>
             </a:extLst>
@@ -4281,740 +5184,7 @@
 </p:sld>
 </file>
 
-<file path=ppt/slides/slide10.xml><?xml version="1.0" encoding="utf-8"?>
-<p:sld xmlns:a="http://schemas.openxmlformats.org/drawingml/2006/main" xmlns:r="http://schemas.openxmlformats.org/officeDocument/2006/relationships" xmlns:p="http://schemas.openxmlformats.org/presentationml/2006/main">
-  <p:cSld>
-    <p:spTree>
-      <p:nvGrpSpPr>
-        <p:cNvPr id="1" name=""/>
-        <p:cNvGrpSpPr/>
-        <p:nvPr/>
-      </p:nvGrpSpPr>
-      <p:grpSpPr>
-        <a:xfrm>
-          <a:off x="0" y="0"/>
-          <a:ext cx="0" cy="0"/>
-          <a:chOff x="0" y="0"/>
-          <a:chExt cx="0" cy="0"/>
-        </a:xfrm>
-      </p:grpSpPr>
-      <p:sp>
-        <p:nvSpPr>
-          <p:cNvPr id="2" name="כותרת 1">
-            <a:extLst>
-              <a:ext uri="{FF2B5EF4-FFF2-40B4-BE49-F238E27FC236}">
-                <a16:creationId xmlns:a16="http://schemas.microsoft.com/office/drawing/2014/main" id="{10BBC13D-BE74-4224-84A7-7E3A62F682C9}"/>
-              </a:ext>
-            </a:extLst>
-          </p:cNvPr>
-          <p:cNvSpPr>
-            <a:spLocks noGrp="1"/>
-          </p:cNvSpPr>
-          <p:nvPr>
-            <p:ph type="title"/>
-          </p:nvPr>
-        </p:nvSpPr>
-        <p:spPr/>
-        <p:txBody>
-          <a:bodyPr/>
-          <a:lstStyle/>
-          <a:p>
-            <a:pPr algn="l" rtl="0"/>
-            <a:r>
-              <a:rPr lang="en-US" dirty="0"/>
-              <a:t>Other</a:t>
-            </a:r>
-            <a:endParaRPr lang="he-IL" dirty="0"/>
-          </a:p>
-        </p:txBody>
-      </p:sp>
-      <p:sp>
-        <p:nvSpPr>
-          <p:cNvPr id="3" name="מציין מיקום תוכן 2">
-            <a:extLst>
-              <a:ext uri="{FF2B5EF4-FFF2-40B4-BE49-F238E27FC236}">
-                <a16:creationId xmlns:a16="http://schemas.microsoft.com/office/drawing/2014/main" id="{A6888108-FB30-4F1B-B0F3-8A4DE272897D}"/>
-              </a:ext>
-            </a:extLst>
-          </p:cNvPr>
-          <p:cNvSpPr>
-            <a:spLocks noGrp="1"/>
-          </p:cNvSpPr>
-          <p:nvPr>
-            <p:ph idx="1"/>
-          </p:nvPr>
-        </p:nvSpPr>
-        <p:spPr>
-          <a:xfrm>
-            <a:off x="567051" y="1568173"/>
-            <a:ext cx="3902476" cy="2027284"/>
-          </a:xfrm>
-        </p:spPr>
-        <p:txBody>
-          <a:bodyPr>
-            <a:normAutofit/>
-          </a:bodyPr>
-          <a:lstStyle/>
-          <a:p>
-            <a:pPr marL="457200" lvl="1" indent="0" algn="l" rtl="0">
-              <a:buNone/>
-            </a:pPr>
-            <a:endParaRPr lang="en-US" dirty="0"/>
-          </a:p>
-          <a:p>
-            <a:pPr marL="457200" lvl="1" indent="0" algn="l" rtl="0">
-              <a:buNone/>
-            </a:pPr>
-            <a:r>
-              <a:rPr lang="en-US" dirty="0"/>
-              <a:t>Person who has the highest count of participating in a nominated move</a:t>
-            </a:r>
-            <a:endParaRPr lang="he-IL" dirty="0"/>
-          </a:p>
-        </p:txBody>
-      </p:sp>
-      <p:grpSp>
-        <p:nvGrpSpPr>
-          <p:cNvPr id="4" name="קבוצה 3">
-            <a:extLst>
-              <a:ext uri="{FF2B5EF4-FFF2-40B4-BE49-F238E27FC236}">
-                <a16:creationId xmlns:a16="http://schemas.microsoft.com/office/drawing/2014/main" id="{E8658A91-8601-4919-80DE-50028DCE0B81}"/>
-              </a:ext>
-            </a:extLst>
-          </p:cNvPr>
-          <p:cNvGrpSpPr/>
-          <p:nvPr/>
-        </p:nvGrpSpPr>
-        <p:grpSpPr>
-          <a:xfrm>
-            <a:off x="-75908" y="180459"/>
-            <a:ext cx="4935523" cy="369332"/>
-            <a:chOff x="998290" y="427839"/>
-            <a:chExt cx="4935523" cy="369332"/>
-          </a:xfrm>
-        </p:grpSpPr>
-        <p:sp>
-          <p:nvSpPr>
-            <p:cNvPr id="5" name="תיבת טקסט 4">
-              <a:extLst>
-                <a:ext uri="{FF2B5EF4-FFF2-40B4-BE49-F238E27FC236}">
-                  <a16:creationId xmlns:a16="http://schemas.microsoft.com/office/drawing/2014/main" id="{847EEE8B-BEB4-445E-8F8E-15E65A4371DA}"/>
-                </a:ext>
-              </a:extLst>
-            </p:cNvPr>
-            <p:cNvSpPr txBox="1"/>
-            <p:nvPr/>
-          </p:nvSpPr>
-          <p:spPr>
-            <a:xfrm>
-              <a:off x="998290" y="427839"/>
-              <a:ext cx="780176" cy="369332"/>
-            </a:xfrm>
-            <a:prstGeom prst="rect">
-              <a:avLst/>
-            </a:prstGeom>
-            <a:noFill/>
-          </p:spPr>
-          <p:txBody>
-            <a:bodyPr wrap="square" rtlCol="1">
-              <a:spAutoFit/>
-            </a:bodyPr>
-            <a:lstStyle/>
-            <a:p>
-              <a:r>
-                <a:rPr lang="en-US" dirty="0">
-                  <a:hlinkClick r:id="rId2" action="ppaction://hlinksldjump"/>
-                </a:rPr>
-                <a:t>Home</a:t>
-              </a:r>
-              <a:endParaRPr lang="he-IL" dirty="0"/>
-            </a:p>
-          </p:txBody>
-        </p:sp>
-        <p:sp>
-          <p:nvSpPr>
-            <p:cNvPr id="6" name="תיבת טקסט 5">
-              <a:extLst>
-                <a:ext uri="{FF2B5EF4-FFF2-40B4-BE49-F238E27FC236}">
-                  <a16:creationId xmlns:a16="http://schemas.microsoft.com/office/drawing/2014/main" id="{2A0A09EA-EA81-40B3-A3CB-F562B892F5EA}"/>
-                </a:ext>
-              </a:extLst>
-            </p:cNvPr>
-            <p:cNvSpPr txBox="1"/>
-            <p:nvPr/>
-          </p:nvSpPr>
-          <p:spPr>
-            <a:xfrm>
-              <a:off x="1677799" y="427839"/>
-              <a:ext cx="1040234" cy="369332"/>
-            </a:xfrm>
-            <a:prstGeom prst="rect">
-              <a:avLst/>
-            </a:prstGeom>
-            <a:noFill/>
-          </p:spPr>
-          <p:txBody>
-            <a:bodyPr wrap="square" rtlCol="1">
-              <a:spAutoFit/>
-            </a:bodyPr>
-            <a:lstStyle/>
-            <a:p>
-              <a:r>
-                <a:rPr lang="en-US" dirty="0">
-                  <a:hlinkClick r:id="rId3" action="ppaction://hlinksldjump"/>
-                </a:rPr>
-                <a:t>Movies</a:t>
-              </a:r>
-              <a:endParaRPr lang="he-IL" dirty="0"/>
-            </a:p>
-          </p:txBody>
-        </p:sp>
-        <p:sp>
-          <p:nvSpPr>
-            <p:cNvPr id="7" name="תיבת טקסט 6">
-              <a:extLst>
-                <a:ext uri="{FF2B5EF4-FFF2-40B4-BE49-F238E27FC236}">
-                  <a16:creationId xmlns:a16="http://schemas.microsoft.com/office/drawing/2014/main" id="{271CCED2-65D5-4D15-B2D8-773D8C17F7BD}"/>
-                </a:ext>
-              </a:extLst>
-            </p:cNvPr>
-            <p:cNvSpPr txBox="1"/>
-            <p:nvPr/>
-          </p:nvSpPr>
-          <p:spPr>
-            <a:xfrm>
-              <a:off x="2836877" y="427839"/>
-              <a:ext cx="1040234" cy="369332"/>
-            </a:xfrm>
-            <a:prstGeom prst="rect">
-              <a:avLst/>
-            </a:prstGeom>
-            <a:noFill/>
-          </p:spPr>
-          <p:txBody>
-            <a:bodyPr wrap="square" rtlCol="1">
-              <a:spAutoFit/>
-            </a:bodyPr>
-            <a:lstStyle/>
-            <a:p>
-              <a:r>
-                <a:rPr lang="en-US" dirty="0">
-                  <a:hlinkClick r:id="rId4" action="ppaction://hlinksldjump"/>
-                </a:rPr>
-                <a:t>Persons</a:t>
-              </a:r>
-              <a:endParaRPr lang="he-IL" dirty="0"/>
-            </a:p>
-          </p:txBody>
-        </p:sp>
-        <p:sp>
-          <p:nvSpPr>
-            <p:cNvPr id="8" name="תיבת טקסט 7">
-              <a:extLst>
-                <a:ext uri="{FF2B5EF4-FFF2-40B4-BE49-F238E27FC236}">
-                  <a16:creationId xmlns:a16="http://schemas.microsoft.com/office/drawing/2014/main" id="{5A97631D-15CC-4DD9-AF92-9D81382C2CF3}"/>
-                </a:ext>
-              </a:extLst>
-            </p:cNvPr>
-            <p:cNvSpPr txBox="1"/>
-            <p:nvPr/>
-          </p:nvSpPr>
-          <p:spPr>
-            <a:xfrm>
-              <a:off x="4028113" y="427839"/>
-              <a:ext cx="974521" cy="369332"/>
-            </a:xfrm>
-            <a:prstGeom prst="rect">
-              <a:avLst/>
-            </a:prstGeom>
-            <a:noFill/>
-          </p:spPr>
-          <p:txBody>
-            <a:bodyPr wrap="square" rtlCol="1">
-              <a:spAutoFit/>
-            </a:bodyPr>
-            <a:lstStyle/>
-            <a:p>
-              <a:r>
-                <a:rPr lang="en-US" dirty="0">
-                  <a:hlinkClick r:id="rId5" action="ppaction://hlinksldjump"/>
-                </a:rPr>
-                <a:t>Awards</a:t>
-              </a:r>
-              <a:endParaRPr lang="en-US" dirty="0"/>
-            </a:p>
-          </p:txBody>
-        </p:sp>
-        <p:sp>
-          <p:nvSpPr>
-            <p:cNvPr id="9" name="תיבת טקסט 8">
-              <a:extLst>
-                <a:ext uri="{FF2B5EF4-FFF2-40B4-BE49-F238E27FC236}">
-                  <a16:creationId xmlns:a16="http://schemas.microsoft.com/office/drawing/2014/main" id="{5D4F4DBE-368B-491A-9B5B-4204CD44EC23}"/>
-                </a:ext>
-              </a:extLst>
-            </p:cNvPr>
-            <p:cNvSpPr txBox="1"/>
-            <p:nvPr/>
-          </p:nvSpPr>
-          <p:spPr>
-            <a:xfrm>
-              <a:off x="5153637" y="427839"/>
-              <a:ext cx="780176" cy="369332"/>
-            </a:xfrm>
-            <a:prstGeom prst="rect">
-              <a:avLst/>
-            </a:prstGeom>
-            <a:noFill/>
-          </p:spPr>
-          <p:txBody>
-            <a:bodyPr wrap="square" rtlCol="1">
-              <a:spAutoFit/>
-            </a:bodyPr>
-            <a:lstStyle/>
-            <a:p>
-              <a:r>
-                <a:rPr lang="en-US" dirty="0"/>
-                <a:t>Other</a:t>
-              </a:r>
-            </a:p>
-          </p:txBody>
-        </p:sp>
-      </p:grpSp>
-      <p:sp>
-        <p:nvSpPr>
-          <p:cNvPr id="10" name="מציין מיקום תוכן 2">
-            <a:extLst>
-              <a:ext uri="{FF2B5EF4-FFF2-40B4-BE49-F238E27FC236}">
-                <a16:creationId xmlns:a16="http://schemas.microsoft.com/office/drawing/2014/main" id="{93D643E3-D81B-4082-BF8C-2E27B8582A98}"/>
-              </a:ext>
-            </a:extLst>
-          </p:cNvPr>
-          <p:cNvSpPr txBox="1">
-            <a:spLocks/>
-          </p:cNvSpPr>
-          <p:nvPr/>
-        </p:nvSpPr>
-        <p:spPr>
-          <a:xfrm>
-            <a:off x="5125573" y="1690688"/>
-            <a:ext cx="4025284" cy="2027284"/>
-          </a:xfrm>
-          <a:prstGeom prst="rect">
-            <a:avLst/>
-          </a:prstGeom>
-        </p:spPr>
-        <p:txBody>
-          <a:bodyPr vert="horz" lIns="91440" tIns="45720" rIns="91440" bIns="45720" rtlCol="1">
-            <a:normAutofit/>
-          </a:bodyPr>
-          <a:lstStyle>
-            <a:lvl1pPr marL="228600" indent="-228600" algn="r" defTabSz="914400" rtl="1" eaLnBrk="1" latinLnBrk="0" hangingPunct="1">
-              <a:lnSpc>
-                <a:spcPct val="90000"/>
-              </a:lnSpc>
-              <a:spcBef>
-                <a:spcPts val="1000"/>
-              </a:spcBef>
-              <a:buFont typeface="Arial" panose="020B0604020202020204" pitchFamily="34" charset="0"/>
-              <a:buChar char="•"/>
-              <a:defRPr sz="2800" kern="1200">
-                <a:solidFill>
-                  <a:schemeClr val="tx1"/>
-                </a:solidFill>
-                <a:latin typeface="+mn-lt"/>
-                <a:ea typeface="+mn-ea"/>
-                <a:cs typeface="+mn-cs"/>
-              </a:defRPr>
-            </a:lvl1pPr>
-            <a:lvl2pPr marL="685800" indent="-228600" algn="r" defTabSz="914400" rtl="1" eaLnBrk="1" latinLnBrk="0" hangingPunct="1">
-              <a:lnSpc>
-                <a:spcPct val="90000"/>
-              </a:lnSpc>
-              <a:spcBef>
-                <a:spcPts val="500"/>
-              </a:spcBef>
-              <a:buFont typeface="Arial" panose="020B0604020202020204" pitchFamily="34" charset="0"/>
-              <a:buChar char="•"/>
-              <a:defRPr sz="2400" kern="1200">
-                <a:solidFill>
-                  <a:schemeClr val="tx1"/>
-                </a:solidFill>
-                <a:latin typeface="+mn-lt"/>
-                <a:ea typeface="+mn-ea"/>
-                <a:cs typeface="+mn-cs"/>
-              </a:defRPr>
-            </a:lvl2pPr>
-            <a:lvl3pPr marL="1143000" indent="-228600" algn="r" defTabSz="914400" rtl="1" eaLnBrk="1" latinLnBrk="0" hangingPunct="1">
-              <a:lnSpc>
-                <a:spcPct val="90000"/>
-              </a:lnSpc>
-              <a:spcBef>
-                <a:spcPts val="500"/>
-              </a:spcBef>
-              <a:buFont typeface="Arial" panose="020B0604020202020204" pitchFamily="34" charset="0"/>
-              <a:buChar char="•"/>
-              <a:defRPr sz="2000" kern="1200">
-                <a:solidFill>
-                  <a:schemeClr val="tx1"/>
-                </a:solidFill>
-                <a:latin typeface="+mn-lt"/>
-                <a:ea typeface="+mn-ea"/>
-                <a:cs typeface="+mn-cs"/>
-              </a:defRPr>
-            </a:lvl3pPr>
-            <a:lvl4pPr marL="1600200" indent="-228600" algn="r" defTabSz="914400" rtl="1" eaLnBrk="1" latinLnBrk="0" hangingPunct="1">
-              <a:lnSpc>
-                <a:spcPct val="90000"/>
-              </a:lnSpc>
-              <a:spcBef>
-                <a:spcPts val="500"/>
-              </a:spcBef>
-              <a:buFont typeface="Arial" panose="020B0604020202020204" pitchFamily="34" charset="0"/>
-              <a:buChar char="•"/>
-              <a:defRPr sz="1800" kern="1200">
-                <a:solidFill>
-                  <a:schemeClr val="tx1"/>
-                </a:solidFill>
-                <a:latin typeface="+mn-lt"/>
-                <a:ea typeface="+mn-ea"/>
-                <a:cs typeface="+mn-cs"/>
-              </a:defRPr>
-            </a:lvl4pPr>
-            <a:lvl5pPr marL="2057400" indent="-228600" algn="r" defTabSz="914400" rtl="1" eaLnBrk="1" latinLnBrk="0" hangingPunct="1">
-              <a:lnSpc>
-                <a:spcPct val="90000"/>
-              </a:lnSpc>
-              <a:spcBef>
-                <a:spcPts val="500"/>
-              </a:spcBef>
-              <a:buFont typeface="Arial" panose="020B0604020202020204" pitchFamily="34" charset="0"/>
-              <a:buChar char="•"/>
-              <a:defRPr sz="1800" kern="1200">
-                <a:solidFill>
-                  <a:schemeClr val="tx1"/>
-                </a:solidFill>
-                <a:latin typeface="+mn-lt"/>
-                <a:ea typeface="+mn-ea"/>
-                <a:cs typeface="+mn-cs"/>
-              </a:defRPr>
-            </a:lvl5pPr>
-            <a:lvl6pPr marL="2514600" indent="-228600" algn="r" defTabSz="914400" rtl="1" eaLnBrk="1" latinLnBrk="0" hangingPunct="1">
-              <a:lnSpc>
-                <a:spcPct val="90000"/>
-              </a:lnSpc>
-              <a:spcBef>
-                <a:spcPts val="500"/>
-              </a:spcBef>
-              <a:buFont typeface="Arial" panose="020B0604020202020204" pitchFamily="34" charset="0"/>
-              <a:buChar char="•"/>
-              <a:defRPr sz="1800" kern="1200">
-                <a:solidFill>
-                  <a:schemeClr val="tx1"/>
-                </a:solidFill>
-                <a:latin typeface="+mn-lt"/>
-                <a:ea typeface="+mn-ea"/>
-                <a:cs typeface="+mn-cs"/>
-              </a:defRPr>
-            </a:lvl6pPr>
-            <a:lvl7pPr marL="2971800" indent="-228600" algn="r" defTabSz="914400" rtl="1" eaLnBrk="1" latinLnBrk="0" hangingPunct="1">
-              <a:lnSpc>
-                <a:spcPct val="90000"/>
-              </a:lnSpc>
-              <a:spcBef>
-                <a:spcPts val="500"/>
-              </a:spcBef>
-              <a:buFont typeface="Arial" panose="020B0604020202020204" pitchFamily="34" charset="0"/>
-              <a:buChar char="•"/>
-              <a:defRPr sz="1800" kern="1200">
-                <a:solidFill>
-                  <a:schemeClr val="tx1"/>
-                </a:solidFill>
-                <a:latin typeface="+mn-lt"/>
-                <a:ea typeface="+mn-ea"/>
-                <a:cs typeface="+mn-cs"/>
-              </a:defRPr>
-            </a:lvl7pPr>
-            <a:lvl8pPr marL="3429000" indent="-228600" algn="r" defTabSz="914400" rtl="1" eaLnBrk="1" latinLnBrk="0" hangingPunct="1">
-              <a:lnSpc>
-                <a:spcPct val="90000"/>
-              </a:lnSpc>
-              <a:spcBef>
-                <a:spcPts val="500"/>
-              </a:spcBef>
-              <a:buFont typeface="Arial" panose="020B0604020202020204" pitchFamily="34" charset="0"/>
-              <a:buChar char="•"/>
-              <a:defRPr sz="1800" kern="1200">
-                <a:solidFill>
-                  <a:schemeClr val="tx1"/>
-                </a:solidFill>
-                <a:latin typeface="+mn-lt"/>
-                <a:ea typeface="+mn-ea"/>
-                <a:cs typeface="+mn-cs"/>
-              </a:defRPr>
-            </a:lvl8pPr>
-            <a:lvl9pPr marL="3886200" indent="-228600" algn="r" defTabSz="914400" rtl="1" eaLnBrk="1" latinLnBrk="0" hangingPunct="1">
-              <a:lnSpc>
-                <a:spcPct val="90000"/>
-              </a:lnSpc>
-              <a:spcBef>
-                <a:spcPts val="500"/>
-              </a:spcBef>
-              <a:buFont typeface="Arial" panose="020B0604020202020204" pitchFamily="34" charset="0"/>
-              <a:buChar char="•"/>
-              <a:defRPr sz="1800" kern="1200">
-                <a:solidFill>
-                  <a:schemeClr val="tx1"/>
-                </a:solidFill>
-                <a:latin typeface="+mn-lt"/>
-                <a:ea typeface="+mn-ea"/>
-                <a:cs typeface="+mn-cs"/>
-              </a:defRPr>
-            </a:lvl9pPr>
-          </a:lstStyle>
-          <a:p>
-            <a:pPr marL="457200" lvl="1" indent="0" algn="l" rtl="0">
-              <a:buFont typeface="Arial" panose="020B0604020202020204" pitchFamily="34" charset="0"/>
-              <a:buNone/>
-            </a:pPr>
-            <a:endParaRPr lang="en-US" dirty="0"/>
-          </a:p>
-          <a:p>
-            <a:pPr marL="457200" lvl="1" indent="0" algn="l" rtl="0">
-              <a:buNone/>
-            </a:pPr>
-            <a:r>
-              <a:rPr lang="en-US" dirty="0"/>
-              <a:t>Person who has the highest count of participating in an award winning move</a:t>
-            </a:r>
-            <a:endParaRPr lang="he-IL" dirty="0"/>
-          </a:p>
-        </p:txBody>
-      </p:sp>
-      <p:sp>
-        <p:nvSpPr>
-          <p:cNvPr id="11" name="מציין מיקום תוכן 2">
-            <a:extLst>
-              <a:ext uri="{FF2B5EF4-FFF2-40B4-BE49-F238E27FC236}">
-                <a16:creationId xmlns:a16="http://schemas.microsoft.com/office/drawing/2014/main" id="{FC1C24A8-91FC-4837-A0F7-C77BC840BC80}"/>
-              </a:ext>
-            </a:extLst>
-          </p:cNvPr>
-          <p:cNvSpPr txBox="1">
-            <a:spLocks/>
-          </p:cNvSpPr>
-          <p:nvPr/>
-        </p:nvSpPr>
-        <p:spPr>
-          <a:xfrm>
-            <a:off x="5960425" y="1532376"/>
-            <a:ext cx="3902476" cy="2933091"/>
-          </a:xfrm>
-          <a:prstGeom prst="rect">
-            <a:avLst/>
-          </a:prstGeom>
-        </p:spPr>
-        <p:txBody>
-          <a:bodyPr vert="horz" lIns="91440" tIns="45720" rIns="91440" bIns="45720" rtlCol="1">
-            <a:normAutofit/>
-          </a:bodyPr>
-          <a:lstStyle>
-            <a:lvl1pPr marL="228600" indent="-228600" algn="r" defTabSz="914400" rtl="1" eaLnBrk="1" latinLnBrk="0" hangingPunct="1">
-              <a:lnSpc>
-                <a:spcPct val="90000"/>
-              </a:lnSpc>
-              <a:spcBef>
-                <a:spcPts val="1000"/>
-              </a:spcBef>
-              <a:buFont typeface="Arial" panose="020B0604020202020204" pitchFamily="34" charset="0"/>
-              <a:buChar char="•"/>
-              <a:defRPr sz="2800" kern="1200">
-                <a:solidFill>
-                  <a:schemeClr val="tx1"/>
-                </a:solidFill>
-                <a:latin typeface="+mn-lt"/>
-                <a:ea typeface="+mn-ea"/>
-                <a:cs typeface="+mn-cs"/>
-              </a:defRPr>
-            </a:lvl1pPr>
-            <a:lvl2pPr marL="685800" indent="-228600" algn="r" defTabSz="914400" rtl="1" eaLnBrk="1" latinLnBrk="0" hangingPunct="1">
-              <a:lnSpc>
-                <a:spcPct val="90000"/>
-              </a:lnSpc>
-              <a:spcBef>
-                <a:spcPts val="500"/>
-              </a:spcBef>
-              <a:buFont typeface="Arial" panose="020B0604020202020204" pitchFamily="34" charset="0"/>
-              <a:buChar char="•"/>
-              <a:defRPr sz="2400" kern="1200">
-                <a:solidFill>
-                  <a:schemeClr val="tx1"/>
-                </a:solidFill>
-                <a:latin typeface="+mn-lt"/>
-                <a:ea typeface="+mn-ea"/>
-                <a:cs typeface="+mn-cs"/>
-              </a:defRPr>
-            </a:lvl2pPr>
-            <a:lvl3pPr marL="1143000" indent="-228600" algn="r" defTabSz="914400" rtl="1" eaLnBrk="1" latinLnBrk="0" hangingPunct="1">
-              <a:lnSpc>
-                <a:spcPct val="90000"/>
-              </a:lnSpc>
-              <a:spcBef>
-                <a:spcPts val="500"/>
-              </a:spcBef>
-              <a:buFont typeface="Arial" panose="020B0604020202020204" pitchFamily="34" charset="0"/>
-              <a:buChar char="•"/>
-              <a:defRPr sz="2000" kern="1200">
-                <a:solidFill>
-                  <a:schemeClr val="tx1"/>
-                </a:solidFill>
-                <a:latin typeface="+mn-lt"/>
-                <a:ea typeface="+mn-ea"/>
-                <a:cs typeface="+mn-cs"/>
-              </a:defRPr>
-            </a:lvl3pPr>
-            <a:lvl4pPr marL="1600200" indent="-228600" algn="r" defTabSz="914400" rtl="1" eaLnBrk="1" latinLnBrk="0" hangingPunct="1">
-              <a:lnSpc>
-                <a:spcPct val="90000"/>
-              </a:lnSpc>
-              <a:spcBef>
-                <a:spcPts val="500"/>
-              </a:spcBef>
-              <a:buFont typeface="Arial" panose="020B0604020202020204" pitchFamily="34" charset="0"/>
-              <a:buChar char="•"/>
-              <a:defRPr sz="1800" kern="1200">
-                <a:solidFill>
-                  <a:schemeClr val="tx1"/>
-                </a:solidFill>
-                <a:latin typeface="+mn-lt"/>
-                <a:ea typeface="+mn-ea"/>
-                <a:cs typeface="+mn-cs"/>
-              </a:defRPr>
-            </a:lvl4pPr>
-            <a:lvl5pPr marL="2057400" indent="-228600" algn="r" defTabSz="914400" rtl="1" eaLnBrk="1" latinLnBrk="0" hangingPunct="1">
-              <a:lnSpc>
-                <a:spcPct val="90000"/>
-              </a:lnSpc>
-              <a:spcBef>
-                <a:spcPts val="500"/>
-              </a:spcBef>
-              <a:buFont typeface="Arial" panose="020B0604020202020204" pitchFamily="34" charset="0"/>
-              <a:buChar char="•"/>
-              <a:defRPr sz="1800" kern="1200">
-                <a:solidFill>
-                  <a:schemeClr val="tx1"/>
-                </a:solidFill>
-                <a:latin typeface="+mn-lt"/>
-                <a:ea typeface="+mn-ea"/>
-                <a:cs typeface="+mn-cs"/>
-              </a:defRPr>
-            </a:lvl5pPr>
-            <a:lvl6pPr marL="2514600" indent="-228600" algn="r" defTabSz="914400" rtl="1" eaLnBrk="1" latinLnBrk="0" hangingPunct="1">
-              <a:lnSpc>
-                <a:spcPct val="90000"/>
-              </a:lnSpc>
-              <a:spcBef>
-                <a:spcPts val="500"/>
-              </a:spcBef>
-              <a:buFont typeface="Arial" panose="020B0604020202020204" pitchFamily="34" charset="0"/>
-              <a:buChar char="•"/>
-              <a:defRPr sz="1800" kern="1200">
-                <a:solidFill>
-                  <a:schemeClr val="tx1"/>
-                </a:solidFill>
-                <a:latin typeface="+mn-lt"/>
-                <a:ea typeface="+mn-ea"/>
-                <a:cs typeface="+mn-cs"/>
-              </a:defRPr>
-            </a:lvl6pPr>
-            <a:lvl7pPr marL="2971800" indent="-228600" algn="r" defTabSz="914400" rtl="1" eaLnBrk="1" latinLnBrk="0" hangingPunct="1">
-              <a:lnSpc>
-                <a:spcPct val="90000"/>
-              </a:lnSpc>
-              <a:spcBef>
-                <a:spcPts val="500"/>
-              </a:spcBef>
-              <a:buFont typeface="Arial" panose="020B0604020202020204" pitchFamily="34" charset="0"/>
-              <a:buChar char="•"/>
-              <a:defRPr sz="1800" kern="1200">
-                <a:solidFill>
-                  <a:schemeClr val="tx1"/>
-                </a:solidFill>
-                <a:latin typeface="+mn-lt"/>
-                <a:ea typeface="+mn-ea"/>
-                <a:cs typeface="+mn-cs"/>
-              </a:defRPr>
-            </a:lvl7pPr>
-            <a:lvl8pPr marL="3429000" indent="-228600" algn="r" defTabSz="914400" rtl="1" eaLnBrk="1" latinLnBrk="0" hangingPunct="1">
-              <a:lnSpc>
-                <a:spcPct val="90000"/>
-              </a:lnSpc>
-              <a:spcBef>
-                <a:spcPts val="500"/>
-              </a:spcBef>
-              <a:buFont typeface="Arial" panose="020B0604020202020204" pitchFamily="34" charset="0"/>
-              <a:buChar char="•"/>
-              <a:defRPr sz="1800" kern="1200">
-                <a:solidFill>
-                  <a:schemeClr val="tx1"/>
-                </a:solidFill>
-                <a:latin typeface="+mn-lt"/>
-                <a:ea typeface="+mn-ea"/>
-                <a:cs typeface="+mn-cs"/>
-              </a:defRPr>
-            </a:lvl8pPr>
-            <a:lvl9pPr marL="3886200" indent="-228600" algn="r" defTabSz="914400" rtl="1" eaLnBrk="1" latinLnBrk="0" hangingPunct="1">
-              <a:lnSpc>
-                <a:spcPct val="90000"/>
-              </a:lnSpc>
-              <a:spcBef>
-                <a:spcPts val="500"/>
-              </a:spcBef>
-              <a:buFont typeface="Arial" panose="020B0604020202020204" pitchFamily="34" charset="0"/>
-              <a:buChar char="•"/>
-              <a:defRPr sz="1800" kern="1200">
-                <a:solidFill>
-                  <a:schemeClr val="tx1"/>
-                </a:solidFill>
-                <a:latin typeface="+mn-lt"/>
-                <a:ea typeface="+mn-ea"/>
-                <a:cs typeface="+mn-cs"/>
-              </a:defRPr>
-            </a:lvl9pPr>
-          </a:lstStyle>
-          <a:p>
-            <a:pPr marL="457200" lvl="1" indent="0" algn="l" rtl="0">
-              <a:buFont typeface="Arial" panose="020B0604020202020204" pitchFamily="34" charset="0"/>
-              <a:buNone/>
-            </a:pPr>
-            <a:endParaRPr lang="en-US" dirty="0"/>
-          </a:p>
-          <a:p>
-            <a:pPr marL="914400" lvl="2" indent="0" algn="l" rtl="0">
-              <a:buNone/>
-            </a:pPr>
-            <a:endParaRPr lang="en-US" dirty="0"/>
-          </a:p>
-          <a:p>
-            <a:pPr lvl="2" algn="l" rtl="0"/>
-            <a:endParaRPr lang="he-IL" dirty="0"/>
-          </a:p>
-        </p:txBody>
-      </p:sp>
-    </p:spTree>
-    <p:extLst>
-      <p:ext uri="{BB962C8B-B14F-4D97-AF65-F5344CB8AC3E}">
-        <p14:creationId xmlns:p14="http://schemas.microsoft.com/office/powerpoint/2010/main" val="1294858795"/>
-      </p:ext>
-    </p:extLst>
-  </p:cSld>
-  <p:clrMapOvr>
-    <a:masterClrMapping/>
-  </p:clrMapOvr>
-</p:sld>
-</file>
-
-<file path=ppt/slides/slide2.xml><?xml version="1.0" encoding="utf-8"?>
+<file path=ppt/slides/slide3.xml><?xml version="1.0" encoding="utf-8"?>
 <p:sld xmlns:a="http://schemas.openxmlformats.org/drawingml/2006/main" xmlns:r="http://schemas.openxmlformats.org/officeDocument/2006/relationships" xmlns:p="http://schemas.openxmlformats.org/presentationml/2006/main">
   <p:cSld>
     <p:spTree>
@@ -5992,7 +6162,7 @@
 </p:sld>
 </file>
 
-<file path=ppt/slides/slide3.xml><?xml version="1.0" encoding="utf-8"?>
+<file path=ppt/slides/slide4.xml><?xml version="1.0" encoding="utf-8"?>
 <p:sld xmlns:a="http://schemas.openxmlformats.org/drawingml/2006/main" xmlns:r="http://schemas.openxmlformats.org/officeDocument/2006/relationships" xmlns:p="http://schemas.openxmlformats.org/presentationml/2006/main">
   <p:cSld>
     <p:spTree>
@@ -6735,7 +6905,7 @@
 </p:sld>
 </file>
 
-<file path=ppt/slides/slide4.xml><?xml version="1.0" encoding="utf-8"?>
+<file path=ppt/slides/slide5.xml><?xml version="1.0" encoding="utf-8"?>
 <p:sld xmlns:a="http://schemas.openxmlformats.org/drawingml/2006/main" xmlns:r="http://schemas.openxmlformats.org/officeDocument/2006/relationships" xmlns:p="http://schemas.openxmlformats.org/presentationml/2006/main">
   <p:cSld>
     <p:spTree>
@@ -7090,7 +7260,7 @@
 </p:sld>
 </file>
 
-<file path=ppt/slides/slide5.xml><?xml version="1.0" encoding="utf-8"?>
+<file path=ppt/slides/slide6.xml><?xml version="1.0" encoding="utf-8"?>
 <p:sld xmlns:a="http://schemas.openxmlformats.org/drawingml/2006/main" xmlns:r="http://schemas.openxmlformats.org/officeDocument/2006/relationships" xmlns:p="http://schemas.openxmlformats.org/presentationml/2006/main">
   <p:cSld>
     <p:spTree>
@@ -7914,7 +8084,7 @@
 </p:sld>
 </file>
 
-<file path=ppt/slides/slide6.xml><?xml version="1.0" encoding="utf-8"?>
+<file path=ppt/slides/slide7.xml><?xml version="1.0" encoding="utf-8"?>
 <p:sld xmlns:a="http://schemas.openxmlformats.org/drawingml/2006/main" xmlns:r="http://schemas.openxmlformats.org/officeDocument/2006/relationships" xmlns:p="http://schemas.openxmlformats.org/presentationml/2006/main">
   <p:cSld>
     <p:spTree>
@@ -8583,7 +8753,7 @@
 </p:sld>
 </file>
 
-<file path=ppt/slides/slide7.xml><?xml version="1.0" encoding="utf-8"?>
+<file path=ppt/slides/slide8.xml><?xml version="1.0" encoding="utf-8"?>
 <p:sld xmlns:a="http://schemas.openxmlformats.org/drawingml/2006/main" xmlns:r="http://schemas.openxmlformats.org/officeDocument/2006/relationships" xmlns:p="http://schemas.openxmlformats.org/presentationml/2006/main">
   <p:cSld>
     <p:spTree>
@@ -10029,7 +10199,7 @@
 </p:sld>
 </file>
 
-<file path=ppt/slides/slide8.xml><?xml version="1.0" encoding="utf-8"?>
+<file path=ppt/slides/slide9.xml><?xml version="1.0" encoding="utf-8"?>
 <p:sld xmlns:a="http://schemas.openxmlformats.org/drawingml/2006/main" xmlns:r="http://schemas.openxmlformats.org/officeDocument/2006/relationships" xmlns:p="http://schemas.openxmlformats.org/presentationml/2006/main">
   <p:cSld>
     <p:spTree>
@@ -10715,342 +10885,6 @@
     <p:extLst>
       <p:ext uri="{BB962C8B-B14F-4D97-AF65-F5344CB8AC3E}">
         <p14:creationId xmlns:p14="http://schemas.microsoft.com/office/powerpoint/2010/main" val="2305906161"/>
-      </p:ext>
-    </p:extLst>
-  </p:cSld>
-  <p:clrMapOvr>
-    <a:masterClrMapping/>
-  </p:clrMapOvr>
-</p:sld>
-</file>
-
-<file path=ppt/slides/slide9.xml><?xml version="1.0" encoding="utf-8"?>
-<p:sld xmlns:a="http://schemas.openxmlformats.org/drawingml/2006/main" xmlns:r="http://schemas.openxmlformats.org/officeDocument/2006/relationships" xmlns:p="http://schemas.openxmlformats.org/presentationml/2006/main">
-  <p:cSld>
-    <p:spTree>
-      <p:nvGrpSpPr>
-        <p:cNvPr id="1" name=""/>
-        <p:cNvGrpSpPr/>
-        <p:nvPr/>
-      </p:nvGrpSpPr>
-      <p:grpSpPr>
-        <a:xfrm>
-          <a:off x="0" y="0"/>
-          <a:ext cx="0" cy="0"/>
-          <a:chOff x="0" y="0"/>
-          <a:chExt cx="0" cy="0"/>
-        </a:xfrm>
-      </p:grpSpPr>
-      <p:sp>
-        <p:nvSpPr>
-          <p:cNvPr id="2" name="כותרת 1">
-            <a:extLst>
-              <a:ext uri="{FF2B5EF4-FFF2-40B4-BE49-F238E27FC236}">
-                <a16:creationId xmlns:a16="http://schemas.microsoft.com/office/drawing/2014/main" id="{E967B0A5-AFF0-498A-9D03-C06616935D95}"/>
-              </a:ext>
-            </a:extLst>
-          </p:cNvPr>
-          <p:cNvSpPr>
-            <a:spLocks noGrp="1"/>
-          </p:cNvSpPr>
-          <p:nvPr>
-            <p:ph type="title"/>
-          </p:nvPr>
-        </p:nvSpPr>
-        <p:spPr/>
-        <p:txBody>
-          <a:bodyPr/>
-          <a:lstStyle/>
-          <a:p>
-            <a:pPr algn="ctr"/>
-            <a:r>
-              <a:rPr lang="en-US" dirty="0"/>
-              <a:t>Genres</a:t>
-            </a:r>
-            <a:endParaRPr lang="he-IL" dirty="0"/>
-          </a:p>
-        </p:txBody>
-      </p:sp>
-      <p:sp>
-        <p:nvSpPr>
-          <p:cNvPr id="3" name="מציין מיקום תוכן 2">
-            <a:extLst>
-              <a:ext uri="{FF2B5EF4-FFF2-40B4-BE49-F238E27FC236}">
-                <a16:creationId xmlns:a16="http://schemas.microsoft.com/office/drawing/2014/main" id="{559ECD38-96E8-4337-BE8F-9485EBED3F79}"/>
-              </a:ext>
-            </a:extLst>
-          </p:cNvPr>
-          <p:cNvSpPr>
-            <a:spLocks noGrp="1"/>
-          </p:cNvSpPr>
-          <p:nvPr>
-            <p:ph idx="1"/>
-          </p:nvPr>
-        </p:nvSpPr>
-        <p:spPr/>
-        <p:txBody>
-          <a:bodyPr/>
-          <a:lstStyle/>
-          <a:p>
-            <a:pPr marL="0" indent="0" algn="l" rtl="0">
-              <a:buNone/>
-            </a:pPr>
-            <a:r>
-              <a:rPr lang="en-US" dirty="0"/>
-              <a:t>Number of Oscar Nominations and Wins for Each Genre</a:t>
-            </a:r>
-          </a:p>
-          <a:p>
-            <a:pPr marL="0" indent="0" algn="l" rtl="0">
-              <a:buNone/>
-            </a:pPr>
-            <a:r>
-              <a:rPr lang="en-US" dirty="0"/>
-              <a:t>List of all genres</a:t>
-            </a:r>
-          </a:p>
-          <a:p>
-            <a:pPr lvl="1" algn="l" rtl="0"/>
-            <a:r>
-              <a:rPr lang="en-US" dirty="0"/>
-              <a:t>genre name</a:t>
-            </a:r>
-          </a:p>
-          <a:p>
-            <a:pPr lvl="1" algn="l" rtl="0"/>
-            <a:r>
-              <a:rPr lang="en-US" dirty="0"/>
-              <a:t>number of nominations</a:t>
-            </a:r>
-          </a:p>
-          <a:p>
-            <a:pPr lvl="1" algn="l" rtl="0"/>
-            <a:r>
-              <a:rPr lang="en-US" dirty="0"/>
-              <a:t>number of wins</a:t>
-            </a:r>
-          </a:p>
-          <a:p>
-            <a:pPr lvl="1" algn="l" rtl="0"/>
-            <a:endParaRPr lang="he-IL" dirty="0"/>
-          </a:p>
-        </p:txBody>
-      </p:sp>
-      <p:grpSp>
-        <p:nvGrpSpPr>
-          <p:cNvPr id="4" name="קבוצה 3">
-            <a:extLst>
-              <a:ext uri="{FF2B5EF4-FFF2-40B4-BE49-F238E27FC236}">
-                <a16:creationId xmlns:a16="http://schemas.microsoft.com/office/drawing/2014/main" id="{047263FD-69CE-4456-AB4F-0C259179E0AB}"/>
-              </a:ext>
-            </a:extLst>
-          </p:cNvPr>
-          <p:cNvGrpSpPr/>
-          <p:nvPr/>
-        </p:nvGrpSpPr>
-        <p:grpSpPr>
-          <a:xfrm>
-            <a:off x="-75908" y="180459"/>
-            <a:ext cx="5257507" cy="369332"/>
-            <a:chOff x="998290" y="427839"/>
-            <a:chExt cx="4990632" cy="369332"/>
-          </a:xfrm>
-        </p:grpSpPr>
-        <p:sp>
-          <p:nvSpPr>
-            <p:cNvPr id="5" name="תיבת טקסט 4">
-              <a:extLst>
-                <a:ext uri="{FF2B5EF4-FFF2-40B4-BE49-F238E27FC236}">
-                  <a16:creationId xmlns:a16="http://schemas.microsoft.com/office/drawing/2014/main" id="{B21E78C7-D469-4432-A126-5E3859D27EE4}"/>
-                </a:ext>
-              </a:extLst>
-            </p:cNvPr>
-            <p:cNvSpPr txBox="1"/>
-            <p:nvPr/>
-          </p:nvSpPr>
-          <p:spPr>
-            <a:xfrm>
-              <a:off x="998290" y="427839"/>
-              <a:ext cx="780176" cy="369332"/>
-            </a:xfrm>
-            <a:prstGeom prst="rect">
-              <a:avLst/>
-            </a:prstGeom>
-            <a:noFill/>
-          </p:spPr>
-          <p:txBody>
-            <a:bodyPr wrap="square" rtlCol="1">
-              <a:spAutoFit/>
-            </a:bodyPr>
-            <a:lstStyle/>
-            <a:p>
-              <a:r>
-                <a:rPr lang="en-US" dirty="0">
-                  <a:hlinkClick r:id="rId2" action="ppaction://hlinksldjump"/>
-                </a:rPr>
-                <a:t>Home</a:t>
-              </a:r>
-              <a:endParaRPr lang="he-IL" dirty="0"/>
-            </a:p>
-          </p:txBody>
-        </p:sp>
-        <p:sp>
-          <p:nvSpPr>
-            <p:cNvPr id="6" name="תיבת טקסט 5">
-              <a:extLst>
-                <a:ext uri="{FF2B5EF4-FFF2-40B4-BE49-F238E27FC236}">
-                  <a16:creationId xmlns:a16="http://schemas.microsoft.com/office/drawing/2014/main" id="{064648F6-714B-46B4-AF00-33FA8CA93D1D}"/>
-                </a:ext>
-              </a:extLst>
-            </p:cNvPr>
-            <p:cNvSpPr txBox="1"/>
-            <p:nvPr/>
-          </p:nvSpPr>
-          <p:spPr>
-            <a:xfrm>
-              <a:off x="1677799" y="427839"/>
-              <a:ext cx="1040234" cy="369332"/>
-            </a:xfrm>
-            <a:prstGeom prst="rect">
-              <a:avLst/>
-            </a:prstGeom>
-            <a:noFill/>
-          </p:spPr>
-          <p:txBody>
-            <a:bodyPr wrap="square" rtlCol="1">
-              <a:spAutoFit/>
-            </a:bodyPr>
-            <a:lstStyle/>
-            <a:p>
-              <a:r>
-                <a:rPr lang="en-US" dirty="0">
-                  <a:hlinkClick r:id="rId3" action="ppaction://hlinksldjump"/>
-                </a:rPr>
-                <a:t>Movies</a:t>
-              </a:r>
-              <a:endParaRPr lang="he-IL" dirty="0"/>
-            </a:p>
-          </p:txBody>
-        </p:sp>
-        <p:sp>
-          <p:nvSpPr>
-            <p:cNvPr id="7" name="תיבת טקסט 6">
-              <a:extLst>
-                <a:ext uri="{FF2B5EF4-FFF2-40B4-BE49-F238E27FC236}">
-                  <a16:creationId xmlns:a16="http://schemas.microsoft.com/office/drawing/2014/main" id="{2C859A22-0919-4F52-88BB-041997416D19}"/>
-                </a:ext>
-              </a:extLst>
-            </p:cNvPr>
-            <p:cNvSpPr txBox="1"/>
-            <p:nvPr/>
-          </p:nvSpPr>
-          <p:spPr>
-            <a:xfrm>
-              <a:off x="2836877" y="427839"/>
-              <a:ext cx="1040234" cy="369332"/>
-            </a:xfrm>
-            <a:prstGeom prst="rect">
-              <a:avLst/>
-            </a:prstGeom>
-            <a:noFill/>
-          </p:spPr>
-          <p:txBody>
-            <a:bodyPr wrap="square" rtlCol="1">
-              <a:spAutoFit/>
-            </a:bodyPr>
-            <a:lstStyle/>
-            <a:p>
-              <a:r>
-                <a:rPr lang="en-US" dirty="0">
-                  <a:hlinkClick r:id="rId4" action="ppaction://hlinksldjump"/>
-                </a:rPr>
-                <a:t>Persons</a:t>
-              </a:r>
-              <a:endParaRPr lang="he-IL" dirty="0"/>
-            </a:p>
-          </p:txBody>
-        </p:sp>
-        <p:sp>
-          <p:nvSpPr>
-            <p:cNvPr id="8" name="תיבת טקסט 7">
-              <a:extLst>
-                <a:ext uri="{FF2B5EF4-FFF2-40B4-BE49-F238E27FC236}">
-                  <a16:creationId xmlns:a16="http://schemas.microsoft.com/office/drawing/2014/main" id="{71F3BD0E-7655-46B5-A6F9-CB6E47A7D8C5}"/>
-                </a:ext>
-              </a:extLst>
-            </p:cNvPr>
-            <p:cNvSpPr txBox="1"/>
-            <p:nvPr/>
-          </p:nvSpPr>
-          <p:spPr>
-            <a:xfrm>
-              <a:off x="4028113" y="427839"/>
-              <a:ext cx="974521" cy="369332"/>
-            </a:xfrm>
-            <a:prstGeom prst="rect">
-              <a:avLst/>
-            </a:prstGeom>
-            <a:noFill/>
-          </p:spPr>
-          <p:txBody>
-            <a:bodyPr wrap="square" rtlCol="1">
-              <a:spAutoFit/>
-            </a:bodyPr>
-            <a:lstStyle/>
-            <a:p>
-              <a:r>
-                <a:rPr lang="en-US" dirty="0">
-                  <a:hlinkClick r:id="rId5" action="ppaction://hlinksldjump"/>
-                </a:rPr>
-                <a:t>Awards</a:t>
-              </a:r>
-              <a:endParaRPr lang="en-US" dirty="0"/>
-            </a:p>
-          </p:txBody>
-        </p:sp>
-        <p:sp>
-          <p:nvSpPr>
-            <p:cNvPr id="9" name="תיבת טקסט 8">
-              <a:extLst>
-                <a:ext uri="{FF2B5EF4-FFF2-40B4-BE49-F238E27FC236}">
-                  <a16:creationId xmlns:a16="http://schemas.microsoft.com/office/drawing/2014/main" id="{613DDB66-0D6A-46AC-86DA-10F525536EDB}"/>
-                </a:ext>
-              </a:extLst>
-            </p:cNvPr>
-            <p:cNvSpPr txBox="1"/>
-            <p:nvPr/>
-          </p:nvSpPr>
-          <p:spPr>
-            <a:xfrm>
-              <a:off x="5153636" y="427839"/>
-              <a:ext cx="835286" cy="369332"/>
-            </a:xfrm>
-            <a:prstGeom prst="rect">
-              <a:avLst/>
-            </a:prstGeom>
-            <a:noFill/>
-          </p:spPr>
-          <p:txBody>
-            <a:bodyPr wrap="square" rtlCol="1">
-              <a:spAutoFit/>
-            </a:bodyPr>
-            <a:lstStyle/>
-            <a:p>
-              <a:r>
-                <a:rPr lang="en-US" dirty="0">
-                  <a:hlinkClick r:id="rId6" action="ppaction://hlinksldjump"/>
-                </a:rPr>
-                <a:t>Genres</a:t>
-              </a:r>
-              <a:endParaRPr lang="en-US" dirty="0"/>
-            </a:p>
-          </p:txBody>
-        </p:sp>
-      </p:grpSp>
-    </p:spTree>
-    <p:extLst>
-      <p:ext uri="{BB962C8B-B14F-4D97-AF65-F5344CB8AC3E}">
-        <p14:creationId xmlns:p14="http://schemas.microsoft.com/office/powerpoint/2010/main" val="25033684"/>
       </p:ext>
     </p:extLst>
   </p:cSld>

</xml_diff>